<commit_message>
added example with MV-MPC and corresponding figure
</commit_message>
<xml_diff>
--- a/Poster.pptx
+++ b/Poster.pptx
@@ -208,7 +208,7 @@
           <a:p>
             <a:fld id="{FA277F2B-B98C-40E6-B7F5-7E6E5F4E44D9}" type="datetimeFigureOut">
               <a:rPr lang="en-GB" smtClean="0"/>
-              <a:t>05/09/2023</a:t>
+              <a:t>06/09/2023</a:t>
             </a:fld>
             <a:endParaRPr lang="en-GB"/>
           </a:p>
@@ -634,7 +634,7 @@
             <a:fld id="{182230BD-888B-4299-A805-2BFBAB3CFA3E}" type="datetimeFigureOut">
               <a:rPr lang="en-GB" smtClean="0"/>
               <a:pPr/>
-              <a:t>04/09/2023</a:t>
+              <a:t>06/09/2023</a:t>
             </a:fld>
             <a:endParaRPr lang="en-GB"/>
           </a:p>
@@ -1247,7 +1247,7 @@
             <a:fld id="{182230BD-888B-4299-A805-2BFBAB3CFA3E}" type="datetimeFigureOut">
               <a:rPr lang="en-GB" smtClean="0"/>
               <a:pPr/>
-              <a:t>04/09/2023</a:t>
+              <a:t>06/09/2023</a:t>
             </a:fld>
             <a:endParaRPr lang="en-GB"/>
           </a:p>
@@ -2152,7 +2152,7 @@
             <a:fld id="{182230BD-888B-4299-A805-2BFBAB3CFA3E}" type="datetimeFigureOut">
               <a:rPr lang="en-GB" smtClean="0"/>
               <a:pPr/>
-              <a:t>04/09/2023</a:t>
+              <a:t>06/09/2023</a:t>
             </a:fld>
             <a:endParaRPr lang="en-GB"/>
           </a:p>
@@ -2825,7 +2825,7 @@
         </p:blipFill>
         <p:spPr>
           <a:xfrm>
-            <a:off x="13173776" y="9368598"/>
+            <a:off x="13173776" y="9252486"/>
             <a:ext cx="7800673" cy="6202755"/>
           </a:xfrm>
           <a:prstGeom prst="rect">
@@ -3071,7 +3071,7 @@
         </p:nvSpPr>
         <p:spPr>
           <a:xfrm>
-            <a:off x="442201" y="24809998"/>
+            <a:off x="442201" y="24635829"/>
             <a:ext cx="7933707" cy="4009459"/>
           </a:xfrm>
         </p:spPr>
@@ -3172,7 +3172,7 @@
         </p:nvSpPr>
         <p:spPr>
           <a:xfrm>
-            <a:off x="7915089" y="15652703"/>
+            <a:off x="7915089" y="15536591"/>
             <a:ext cx="5121970" cy="597733"/>
           </a:xfrm>
         </p:spPr>
@@ -3327,7 +3327,7 @@
         </p:nvCxnSpPr>
         <p:spPr>
           <a:xfrm>
-            <a:off x="424241" y="25497513"/>
+            <a:off x="424241" y="25323344"/>
             <a:ext cx="7416253" cy="0"/>
           </a:xfrm>
           <a:prstGeom prst="line">
@@ -3368,7 +3368,7 @@
         </p:nvGrpSpPr>
         <p:grpSpPr>
           <a:xfrm>
-            <a:off x="7915088" y="8796630"/>
+            <a:off x="7915088" y="8680518"/>
             <a:ext cx="5152571" cy="6748021"/>
             <a:chOff x="7658964" y="7124200"/>
             <a:chExt cx="5152571" cy="6748021"/>
@@ -5320,7 +5320,7 @@
         </p:nvSpPr>
         <p:spPr>
           <a:xfrm>
-            <a:off x="15234349" y="15659491"/>
+            <a:off x="15234349" y="15543379"/>
             <a:ext cx="4287365" cy="243037"/>
           </a:xfrm>
           <a:prstGeom prst="rect">
@@ -6003,7 +6003,7 @@
           <a:p>
             <a:r>
               <a:rPr lang="en-GB" dirty="0"/>
-              <a:t>In its first iteration AirBorne the data layer and back testing framework, but its design allows the placement of a Live Trading feature to seamlessly transfer strategies from idealized simulations to the real thing. Figures 1 and 2 display the internal distribution of features in the package and the flow of data when using it.</a:t>
+              <a:t>In its first iteration AirBorne counts with its data layer and back testing framework, but its design allows the placement of a Live Trading feature to seamlessly transfer strategies from idealized simulations to the real thing. Figures 1 and 2 display the internal distribution of features in the package and the flow of data when using it.</a:t>
             </a:r>
           </a:p>
           <a:p>
@@ -6054,441 +6054,300 @@
           </a:fontRef>
         </p:style>
       </p:cxnSp>
-      <p:grpSp>
-        <p:nvGrpSpPr>
-          <p:cNvPr id="21" name="Group 20">
+      <p:sp>
+        <p:nvSpPr>
+          <p:cNvPr id="125" name="Text Placeholder 8">
             <a:extLst>
               <a:ext uri="{FF2B5EF4-FFF2-40B4-BE49-F238E27FC236}">
-                <a16:creationId xmlns:a16="http://schemas.microsoft.com/office/drawing/2014/main" id="{92C793B2-B11A-9039-E188-867AA669E9A0}"/>
+                <a16:creationId xmlns:a16="http://schemas.microsoft.com/office/drawing/2014/main" id="{428E7C72-FD1A-8007-3F33-11EAA72D62C3}"/>
               </a:ext>
             </a:extLst>
           </p:cNvPr>
-          <p:cNvGrpSpPr/>
+          <p:cNvSpPr txBox="1">
+            <a:spLocks/>
+          </p:cNvSpPr>
           <p:nvPr/>
-        </p:nvGrpSpPr>
-        <p:grpSpPr>
+        </p:nvSpPr>
+        <p:spPr>
           <a:xfrm>
-            <a:off x="9475252" y="24256391"/>
-            <a:ext cx="11278249" cy="4542069"/>
-            <a:chOff x="9555775" y="18336704"/>
-            <a:chExt cx="11278249" cy="4542069"/>
+            <a:off x="8913157" y="28067717"/>
+            <a:ext cx="6165724" cy="597733"/>
           </a:xfrm>
-        </p:grpSpPr>
-        <p:grpSp>
-          <p:nvGrpSpPr>
-            <p:cNvPr id="13" name="Group 12">
-              <a:extLst>
-                <a:ext uri="{FF2B5EF4-FFF2-40B4-BE49-F238E27FC236}">
-                  <a16:creationId xmlns:a16="http://schemas.microsoft.com/office/drawing/2014/main" id="{56972F0A-D7EC-4EEA-D198-2D30C6E77A88}"/>
-                </a:ext>
-              </a:extLst>
-            </p:cNvPr>
-            <p:cNvGrpSpPr/>
-            <p:nvPr/>
-          </p:nvGrpSpPr>
-          <p:grpSpPr>
-            <a:xfrm>
-              <a:off x="9555775" y="18336704"/>
-              <a:ext cx="11278249" cy="4542069"/>
-              <a:chOff x="9555775" y="18028184"/>
-              <a:chExt cx="11278249" cy="4542069"/>
-            </a:xfrm>
-          </p:grpSpPr>
-          <p:sp>
-            <p:nvSpPr>
-              <p:cNvPr id="125" name="Text Placeholder 8">
-                <a:extLst>
-                  <a:ext uri="{FF2B5EF4-FFF2-40B4-BE49-F238E27FC236}">
-                    <a16:creationId xmlns:a16="http://schemas.microsoft.com/office/drawing/2014/main" id="{428E7C72-FD1A-8007-3F33-11EAA72D62C3}"/>
-                  </a:ext>
-                </a:extLst>
-              </p:cNvPr>
-              <p:cNvSpPr txBox="1">
-                <a:spLocks/>
-              </p:cNvSpPr>
-              <p:nvPr/>
-            </p:nvSpPr>
-            <p:spPr>
-              <a:xfrm>
-                <a:off x="9624014" y="21972520"/>
-                <a:ext cx="11091865" cy="597733"/>
-              </a:xfrm>
-              <a:prstGeom prst="rect">
-                <a:avLst/>
-              </a:prstGeom>
-            </p:spPr>
-            <p:txBody>
-              <a:bodyPr vert="horz" lIns="0" tIns="0" rIns="0" bIns="0" rtlCol="0">
-                <a:noAutofit/>
-              </a:bodyPr>
-              <a:lstStyle>
-                <a:lvl1pPr marL="0" indent="0" algn="l" defTabSz="2138314" rtl="0" eaLnBrk="1" latinLnBrk="0" hangingPunct="1">
-                  <a:lnSpc>
-                    <a:spcPct val="90000"/>
-                  </a:lnSpc>
-                  <a:spcBef>
-                    <a:spcPts val="0"/>
-                  </a:spcBef>
-                  <a:spcAft>
-                    <a:spcPts val="0"/>
-                  </a:spcAft>
-                  <a:buFont typeface="Arial" panose="020B0604020202020204" pitchFamily="34" charset="0"/>
-                  <a:buNone/>
-                  <a:defRPr sz="1200" i="1" kern="1200">
-                    <a:solidFill>
-                      <a:schemeClr val="tx1"/>
-                    </a:solidFill>
-                    <a:latin typeface="+mn-lt"/>
-                    <a:ea typeface="+mn-ea"/>
-                    <a:cs typeface="+mn-cs"/>
-                  </a:defRPr>
-                </a:lvl1pPr>
-                <a:lvl2pPr marL="0" indent="0" algn="l" defTabSz="2138314" rtl="0" eaLnBrk="1" latinLnBrk="0" hangingPunct="1">
-                  <a:lnSpc>
-                    <a:spcPct val="83000"/>
-                  </a:lnSpc>
-                  <a:spcBef>
-                    <a:spcPts val="0"/>
-                  </a:spcBef>
-                  <a:spcAft>
-                    <a:spcPts val="2684"/>
-                  </a:spcAft>
-                  <a:buFont typeface="Arial" panose="020B0604020202020204" pitchFamily="34" charset="0"/>
-                  <a:buNone/>
-                  <a:defRPr sz="5000" kern="1200">
-                    <a:solidFill>
-                      <a:schemeClr val="tx1"/>
-                    </a:solidFill>
-                    <a:latin typeface="+mn-lt"/>
-                    <a:ea typeface="+mn-ea"/>
-                    <a:cs typeface="+mn-cs"/>
-                  </a:defRPr>
-                </a:lvl2pPr>
-                <a:lvl3pPr marL="0" indent="0" algn="l" defTabSz="2138314" rtl="0" eaLnBrk="1" latinLnBrk="0" hangingPunct="1">
-                  <a:lnSpc>
-                    <a:spcPct val="90000"/>
-                  </a:lnSpc>
-                  <a:spcBef>
-                    <a:spcPts val="0"/>
-                  </a:spcBef>
-                  <a:spcAft>
-                    <a:spcPts val="3320"/>
-                  </a:spcAft>
-                  <a:buFont typeface="Arial" panose="020B0604020202020204" pitchFamily="34" charset="0"/>
-                  <a:buNone/>
-                  <a:defRPr sz="3200" kern="1200">
-                    <a:solidFill>
-                      <a:schemeClr val="tx1"/>
-                    </a:solidFill>
-                    <a:latin typeface="+mn-lt"/>
-                    <a:ea typeface="+mn-ea"/>
-                    <a:cs typeface="+mn-cs"/>
-                  </a:defRPr>
-                </a:lvl3pPr>
-                <a:lvl4pPr marL="0" indent="0" algn="l" defTabSz="2138314" rtl="0" eaLnBrk="1" latinLnBrk="0" hangingPunct="1">
-                  <a:lnSpc>
-                    <a:spcPct val="90000"/>
-                  </a:lnSpc>
-                  <a:spcBef>
-                    <a:spcPts val="0"/>
-                  </a:spcBef>
-                  <a:buFont typeface="Arial" panose="020B0604020202020204" pitchFamily="34" charset="0"/>
-                  <a:buNone/>
-                  <a:defRPr sz="2684" b="1" kern="1200">
-                    <a:solidFill>
-                      <a:schemeClr val="accent3"/>
-                    </a:solidFill>
-                    <a:latin typeface="+mn-lt"/>
-                    <a:ea typeface="+mn-ea"/>
-                    <a:cs typeface="+mn-cs"/>
-                  </a:defRPr>
-                </a:lvl4pPr>
-                <a:lvl5pPr marL="0" indent="0" algn="l" defTabSz="2138314" rtl="0" eaLnBrk="1" latinLnBrk="0" hangingPunct="1">
-                  <a:lnSpc>
-                    <a:spcPct val="90000"/>
-                  </a:lnSpc>
-                  <a:spcBef>
-                    <a:spcPts val="0"/>
-                  </a:spcBef>
-                  <a:buFont typeface="Arial" panose="020B0604020202020204" pitchFamily="34" charset="0"/>
-                  <a:buNone/>
-                  <a:defRPr sz="2100" b="1" kern="1200">
-                    <a:solidFill>
-                      <a:schemeClr val="tx1"/>
-                    </a:solidFill>
-                    <a:latin typeface="+mn-lt"/>
-                    <a:ea typeface="+mn-ea"/>
-                    <a:cs typeface="+mn-cs"/>
-                  </a:defRPr>
-                </a:lvl5pPr>
-                <a:lvl6pPr marL="0" indent="0" algn="l" defTabSz="2138314" rtl="0" eaLnBrk="1" latinLnBrk="0" hangingPunct="1">
-                  <a:lnSpc>
-                    <a:spcPct val="90000"/>
-                  </a:lnSpc>
-                  <a:spcBef>
-                    <a:spcPts val="0"/>
-                  </a:spcBef>
-                  <a:buFont typeface="Arial" panose="020B0604020202020204" pitchFamily="34" charset="0"/>
-                  <a:buNone/>
-                  <a:defRPr sz="2100" kern="1200">
-                    <a:solidFill>
-                      <a:schemeClr val="tx1"/>
-                    </a:solidFill>
-                    <a:latin typeface="+mn-lt"/>
-                    <a:ea typeface="+mn-ea"/>
-                    <a:cs typeface="+mn-cs"/>
-                  </a:defRPr>
-                </a:lvl6pPr>
-                <a:lvl7pPr marL="0" indent="0" algn="l" defTabSz="2138314" rtl="0" eaLnBrk="1" latinLnBrk="0" hangingPunct="1">
-                  <a:lnSpc>
-                    <a:spcPct val="90000"/>
-                  </a:lnSpc>
-                  <a:spcBef>
-                    <a:spcPts val="0"/>
-                  </a:spcBef>
-                  <a:spcAft>
-                    <a:spcPts val="3673"/>
-                  </a:spcAft>
-                  <a:buFont typeface="Arial" panose="020B0604020202020204" pitchFamily="34" charset="0"/>
-                  <a:buNone/>
-                  <a:defRPr sz="1130" kern="1200" cap="all" baseline="0">
-                    <a:solidFill>
-                      <a:schemeClr val="tx1"/>
-                    </a:solidFill>
-                    <a:latin typeface="+mn-lt"/>
-                    <a:ea typeface="+mn-ea"/>
-                    <a:cs typeface="+mn-cs"/>
-                  </a:defRPr>
-                </a:lvl7pPr>
-                <a:lvl8pPr marL="177988" indent="-177988" algn="l" defTabSz="2138314" rtl="0" eaLnBrk="1" latinLnBrk="0" hangingPunct="1">
-                  <a:lnSpc>
-                    <a:spcPct val="90000"/>
-                  </a:lnSpc>
-                  <a:spcBef>
-                    <a:spcPts val="0"/>
-                  </a:spcBef>
-                  <a:buClr>
-                    <a:schemeClr val="accent3"/>
-                  </a:buClr>
-                  <a:buFont typeface="Arial" panose="020B0604020202020204" pitchFamily="34" charset="0"/>
-                  <a:buChar char="•"/>
-                  <a:defRPr sz="1695" kern="1200">
-                    <a:solidFill>
-                      <a:schemeClr val="tx1"/>
-                    </a:solidFill>
-                    <a:latin typeface="+mn-lt"/>
-                    <a:ea typeface="+mn-ea"/>
-                    <a:cs typeface="+mn-cs"/>
-                  </a:defRPr>
-                </a:lvl8pPr>
-                <a:lvl9pPr marL="355975" indent="-355975" algn="l" defTabSz="2138314" rtl="0" eaLnBrk="1" latinLnBrk="0" hangingPunct="1">
-                  <a:lnSpc>
-                    <a:spcPct val="90000"/>
-                  </a:lnSpc>
-                  <a:spcBef>
-                    <a:spcPts val="0"/>
-                  </a:spcBef>
-                  <a:buClr>
-                    <a:schemeClr val="accent3"/>
-                  </a:buClr>
-                  <a:buFont typeface="Arial" panose="020B0604020202020204" pitchFamily="34" charset="0"/>
-                  <a:buChar char="•"/>
-                  <a:defRPr sz="1695" kern="1200">
-                    <a:solidFill>
-                      <a:schemeClr val="tx1"/>
-                    </a:solidFill>
-                    <a:latin typeface="+mn-lt"/>
-                    <a:ea typeface="+mn-ea"/>
-                    <a:cs typeface="+mn-cs"/>
-                  </a:defRPr>
-                </a:lvl9pPr>
-              </a:lstStyle>
-              <a:p>
-                <a:r>
-                  <a:rPr lang="en-GB" dirty="0"/>
-                  <a:t>Figure 4: Comparison of Mean Relative Absolute Error (</a:t>
-                </a:r>
-                <a:r>
-                  <a:rPr lang="en-GB" dirty="0" err="1"/>
-                  <a:t>MRAEf</a:t>
-                </a:r>
-                <a:r>
-                  <a:rPr lang="en-GB" dirty="0"/>
-                  <a:t>) of different forecasting methods predicting the returns of 22 US stocks through 2020 per forecast distance.</a:t>
-                </a:r>
-              </a:p>
-            </p:txBody>
-          </p:sp>
-          <p:pic>
-            <p:nvPicPr>
-              <p:cNvPr id="11" name="Picture 10">
-                <a:extLst>
-                  <a:ext uri="{FF2B5EF4-FFF2-40B4-BE49-F238E27FC236}">
-                    <a16:creationId xmlns:a16="http://schemas.microsoft.com/office/drawing/2014/main" id="{A3E044D5-A9A3-0EC8-A2A1-547DE7DFACE3}"/>
-                  </a:ext>
-                </a:extLst>
-              </p:cNvPr>
-              <p:cNvPicPr>
-                <a:picLocks noChangeAspect="1"/>
-              </p:cNvPicPr>
-              <p:nvPr/>
-            </p:nvPicPr>
-            <p:blipFill>
-              <a:blip r:embed="rId6"/>
-              <a:stretch>
-                <a:fillRect/>
-              </a:stretch>
-            </p:blipFill>
-            <p:spPr>
-              <a:xfrm>
-                <a:off x="9555775" y="18028184"/>
-                <a:ext cx="5486612" cy="3777045"/>
-              </a:xfrm>
-              <a:prstGeom prst="rect">
-                <a:avLst/>
-              </a:prstGeom>
-            </p:spPr>
-          </p:pic>
-          <p:pic>
-            <p:nvPicPr>
-              <p:cNvPr id="123" name="Picture 122">
-                <a:extLst>
-                  <a:ext uri="{FF2B5EF4-FFF2-40B4-BE49-F238E27FC236}">
-                    <a16:creationId xmlns:a16="http://schemas.microsoft.com/office/drawing/2014/main" id="{F35699CC-FAFB-C22D-9D59-0CA9EC895F21}"/>
-                  </a:ext>
-                </a:extLst>
-              </p:cNvPr>
-              <p:cNvPicPr>
-                <a:picLocks noChangeAspect="1"/>
-              </p:cNvPicPr>
-              <p:nvPr/>
-            </p:nvPicPr>
-            <p:blipFill>
-              <a:blip r:embed="rId7">
-                <a:clrChange>
-                  <a:clrFrom>
-                    <a:srgbClr val="FFFFFF"/>
-                  </a:clrFrom>
-                  <a:clrTo>
-                    <a:srgbClr val="FFFFFF">
-                      <a:alpha val="0"/>
-                    </a:srgbClr>
-                  </a:clrTo>
-                </a:clrChange>
-              </a:blip>
-              <a:stretch>
-                <a:fillRect/>
-              </a:stretch>
-            </p:blipFill>
-            <p:spPr>
-              <a:xfrm>
-                <a:off x="15149100" y="18150965"/>
-                <a:ext cx="5684924" cy="3531485"/>
-              </a:xfrm>
-              <a:prstGeom prst="rect">
-                <a:avLst/>
-              </a:prstGeom>
-            </p:spPr>
-          </p:pic>
-        </p:grpSp>
-        <p:sp>
-          <p:nvSpPr>
-            <p:cNvPr id="17" name="Left Brace 16">
-              <a:extLst>
-                <a:ext uri="{FF2B5EF4-FFF2-40B4-BE49-F238E27FC236}">
-                  <a16:creationId xmlns:a16="http://schemas.microsoft.com/office/drawing/2014/main" id="{DC4EAB39-2389-C5FE-D726-A2182F2A7086}"/>
-                </a:ext>
-              </a:extLst>
-            </p:cNvPr>
-            <p:cNvSpPr/>
-            <p:nvPr/>
-          </p:nvSpPr>
-          <p:spPr>
-            <a:xfrm>
-              <a:off x="14926199" y="18392745"/>
-              <a:ext cx="339090" cy="3127055"/>
-            </a:xfrm>
-            <a:prstGeom prst="leftBrace">
-              <a:avLst>
-                <a:gd name="adj1" fmla="val 27080"/>
-                <a:gd name="adj2" fmla="val 94777"/>
-              </a:avLst>
-            </a:prstGeom>
-            <a:ln w="12700">
-              <a:solidFill>
+          <a:prstGeom prst="rect">
+            <a:avLst/>
+          </a:prstGeom>
+        </p:spPr>
+        <p:txBody>
+          <a:bodyPr vert="horz" lIns="0" tIns="0" rIns="0" bIns="0" rtlCol="0">
+            <a:noAutofit/>
+          </a:bodyPr>
+          <a:lstStyle>
+            <a:lvl1pPr marL="0" indent="0" algn="l" defTabSz="2138314" rtl="0" eaLnBrk="1" latinLnBrk="0" hangingPunct="1">
+              <a:lnSpc>
+                <a:spcPct val="90000"/>
+              </a:lnSpc>
+              <a:spcBef>
+                <a:spcPts val="0"/>
+              </a:spcBef>
+              <a:spcAft>
+                <a:spcPts val="0"/>
+              </a:spcAft>
+              <a:buFont typeface="Arial" panose="020B0604020202020204" pitchFamily="34" charset="0"/>
+              <a:buNone/>
+              <a:defRPr sz="1200" i="1" kern="1200">
+                <a:solidFill>
+                  <a:schemeClr val="tx1"/>
+                </a:solidFill>
+                <a:latin typeface="+mn-lt"/>
+                <a:ea typeface="+mn-ea"/>
+                <a:cs typeface="+mn-cs"/>
+              </a:defRPr>
+            </a:lvl1pPr>
+            <a:lvl2pPr marL="0" indent="0" algn="l" defTabSz="2138314" rtl="0" eaLnBrk="1" latinLnBrk="0" hangingPunct="1">
+              <a:lnSpc>
+                <a:spcPct val="83000"/>
+              </a:lnSpc>
+              <a:spcBef>
+                <a:spcPts val="0"/>
+              </a:spcBef>
+              <a:spcAft>
+                <a:spcPts val="2684"/>
+              </a:spcAft>
+              <a:buFont typeface="Arial" panose="020B0604020202020204" pitchFamily="34" charset="0"/>
+              <a:buNone/>
+              <a:defRPr sz="5000" kern="1200">
+                <a:solidFill>
+                  <a:schemeClr val="tx1"/>
+                </a:solidFill>
+                <a:latin typeface="+mn-lt"/>
+                <a:ea typeface="+mn-ea"/>
+                <a:cs typeface="+mn-cs"/>
+              </a:defRPr>
+            </a:lvl2pPr>
+            <a:lvl3pPr marL="0" indent="0" algn="l" defTabSz="2138314" rtl="0" eaLnBrk="1" latinLnBrk="0" hangingPunct="1">
+              <a:lnSpc>
+                <a:spcPct val="90000"/>
+              </a:lnSpc>
+              <a:spcBef>
+                <a:spcPts val="0"/>
+              </a:spcBef>
+              <a:spcAft>
+                <a:spcPts val="3320"/>
+              </a:spcAft>
+              <a:buFont typeface="Arial" panose="020B0604020202020204" pitchFamily="34" charset="0"/>
+              <a:buNone/>
+              <a:defRPr sz="3200" kern="1200">
+                <a:solidFill>
+                  <a:schemeClr val="tx1"/>
+                </a:solidFill>
+                <a:latin typeface="+mn-lt"/>
+                <a:ea typeface="+mn-ea"/>
+                <a:cs typeface="+mn-cs"/>
+              </a:defRPr>
+            </a:lvl3pPr>
+            <a:lvl4pPr marL="0" indent="0" algn="l" defTabSz="2138314" rtl="0" eaLnBrk="1" latinLnBrk="0" hangingPunct="1">
+              <a:lnSpc>
+                <a:spcPct val="90000"/>
+              </a:lnSpc>
+              <a:spcBef>
+                <a:spcPts val="0"/>
+              </a:spcBef>
+              <a:buFont typeface="Arial" panose="020B0604020202020204" pitchFamily="34" charset="0"/>
+              <a:buNone/>
+              <a:defRPr sz="2684" b="1" kern="1200">
+                <a:solidFill>
+                  <a:schemeClr val="accent3"/>
+                </a:solidFill>
+                <a:latin typeface="+mn-lt"/>
+                <a:ea typeface="+mn-ea"/>
+                <a:cs typeface="+mn-cs"/>
+              </a:defRPr>
+            </a:lvl4pPr>
+            <a:lvl5pPr marL="0" indent="0" algn="l" defTabSz="2138314" rtl="0" eaLnBrk="1" latinLnBrk="0" hangingPunct="1">
+              <a:lnSpc>
+                <a:spcPct val="90000"/>
+              </a:lnSpc>
+              <a:spcBef>
+                <a:spcPts val="0"/>
+              </a:spcBef>
+              <a:buFont typeface="Arial" panose="020B0604020202020204" pitchFamily="34" charset="0"/>
+              <a:buNone/>
+              <a:defRPr sz="2100" b="1" kern="1200">
+                <a:solidFill>
+                  <a:schemeClr val="tx1"/>
+                </a:solidFill>
+                <a:latin typeface="+mn-lt"/>
+                <a:ea typeface="+mn-ea"/>
+                <a:cs typeface="+mn-cs"/>
+              </a:defRPr>
+            </a:lvl5pPr>
+            <a:lvl6pPr marL="0" indent="0" algn="l" defTabSz="2138314" rtl="0" eaLnBrk="1" latinLnBrk="0" hangingPunct="1">
+              <a:lnSpc>
+                <a:spcPct val="90000"/>
+              </a:lnSpc>
+              <a:spcBef>
+                <a:spcPts val="0"/>
+              </a:spcBef>
+              <a:buFont typeface="Arial" panose="020B0604020202020204" pitchFamily="34" charset="0"/>
+              <a:buNone/>
+              <a:defRPr sz="2100" kern="1200">
+                <a:solidFill>
+                  <a:schemeClr val="tx1"/>
+                </a:solidFill>
+                <a:latin typeface="+mn-lt"/>
+                <a:ea typeface="+mn-ea"/>
+                <a:cs typeface="+mn-cs"/>
+              </a:defRPr>
+            </a:lvl6pPr>
+            <a:lvl7pPr marL="0" indent="0" algn="l" defTabSz="2138314" rtl="0" eaLnBrk="1" latinLnBrk="0" hangingPunct="1">
+              <a:lnSpc>
+                <a:spcPct val="90000"/>
+              </a:lnSpc>
+              <a:spcBef>
+                <a:spcPts val="0"/>
+              </a:spcBef>
+              <a:spcAft>
+                <a:spcPts val="3673"/>
+              </a:spcAft>
+              <a:buFont typeface="Arial" panose="020B0604020202020204" pitchFamily="34" charset="0"/>
+              <a:buNone/>
+              <a:defRPr sz="1130" kern="1200" cap="all" baseline="0">
+                <a:solidFill>
+                  <a:schemeClr val="tx1"/>
+                </a:solidFill>
+                <a:latin typeface="+mn-lt"/>
+                <a:ea typeface="+mn-ea"/>
+                <a:cs typeface="+mn-cs"/>
+              </a:defRPr>
+            </a:lvl7pPr>
+            <a:lvl8pPr marL="177988" indent="-177988" algn="l" defTabSz="2138314" rtl="0" eaLnBrk="1" latinLnBrk="0" hangingPunct="1">
+              <a:lnSpc>
+                <a:spcPct val="90000"/>
+              </a:lnSpc>
+              <a:spcBef>
+                <a:spcPts val="0"/>
+              </a:spcBef>
+              <a:buClr>
                 <a:schemeClr val="accent3"/>
-              </a:solidFill>
-            </a:ln>
-          </p:spPr>
-          <p:style>
-            <a:lnRef idx="1">
-              <a:schemeClr val="accent1"/>
-            </a:lnRef>
-            <a:fillRef idx="0">
-              <a:schemeClr val="accent1"/>
-            </a:fillRef>
-            <a:effectRef idx="0">
-              <a:schemeClr val="accent1"/>
-            </a:effectRef>
-            <a:fontRef idx="minor">
-              <a:schemeClr val="tx1"/>
-            </a:fontRef>
-          </p:style>
-          <p:txBody>
-            <a:bodyPr rtlCol="0" anchor="ctr"/>
-            <a:lstStyle/>
-            <a:p>
-              <a:pPr algn="ctr"/>
-              <a:endParaRPr lang="en-GB"/>
-            </a:p>
-          </p:txBody>
-        </p:sp>
-        <p:cxnSp>
-          <p:nvCxnSpPr>
-            <p:cNvPr id="19" name="Connector: Curved 18">
-              <a:extLst>
-                <a:ext uri="{FF2B5EF4-FFF2-40B4-BE49-F238E27FC236}">
-                  <a16:creationId xmlns:a16="http://schemas.microsoft.com/office/drawing/2014/main" id="{FDA7B239-7EA3-CA1E-C9A3-4525D2C3CF1C}"/>
-                </a:ext>
-              </a:extLst>
-            </p:cNvPr>
-            <p:cNvCxnSpPr>
-              <a:cxnSpLocks/>
-              <a:endCxn id="17" idx="1"/>
-            </p:cNvCxnSpPr>
-            <p:nvPr/>
-          </p:nvCxnSpPr>
-          <p:spPr>
-            <a:xfrm flipV="1">
-              <a:off x="14747240" y="21356474"/>
-              <a:ext cx="178959" cy="91286"/>
-            </a:xfrm>
-            <a:prstGeom prst="curvedConnector3">
-              <a:avLst/>
-            </a:prstGeom>
-            <a:ln w="19050">
-              <a:solidFill>
+              </a:buClr>
+              <a:buFont typeface="Arial" panose="020B0604020202020204" pitchFamily="34" charset="0"/>
+              <a:buChar char="•"/>
+              <a:defRPr sz="1695" kern="1200">
+                <a:solidFill>
+                  <a:schemeClr val="tx1"/>
+                </a:solidFill>
+                <a:latin typeface="+mn-lt"/>
+                <a:ea typeface="+mn-ea"/>
+                <a:cs typeface="+mn-cs"/>
+              </a:defRPr>
+            </a:lvl8pPr>
+            <a:lvl9pPr marL="355975" indent="-355975" algn="l" defTabSz="2138314" rtl="0" eaLnBrk="1" latinLnBrk="0" hangingPunct="1">
+              <a:lnSpc>
+                <a:spcPct val="90000"/>
+              </a:lnSpc>
+              <a:spcBef>
+                <a:spcPts val="0"/>
+              </a:spcBef>
+              <a:buClr>
                 <a:schemeClr val="accent3"/>
-              </a:solidFill>
-              <a:tailEnd type="triangle"/>
-            </a:ln>
-          </p:spPr>
-          <p:style>
-            <a:lnRef idx="1">
-              <a:schemeClr val="accent1"/>
-            </a:lnRef>
-            <a:fillRef idx="0">
-              <a:schemeClr val="accent1"/>
-            </a:fillRef>
-            <a:effectRef idx="0">
-              <a:schemeClr val="accent1"/>
-            </a:effectRef>
-            <a:fontRef idx="minor">
-              <a:schemeClr val="tx1"/>
-            </a:fontRef>
-          </p:style>
-        </p:cxnSp>
-      </p:grpSp>
+              </a:buClr>
+              <a:buFont typeface="Arial" panose="020B0604020202020204" pitchFamily="34" charset="0"/>
+              <a:buChar char="•"/>
+              <a:defRPr sz="1695" kern="1200">
+                <a:solidFill>
+                  <a:schemeClr val="tx1"/>
+                </a:solidFill>
+                <a:latin typeface="+mn-lt"/>
+                <a:ea typeface="+mn-ea"/>
+                <a:cs typeface="+mn-cs"/>
+              </a:defRPr>
+            </a:lvl9pPr>
+          </a:lstStyle>
+          <a:p>
+            <a:r>
+              <a:rPr lang="en-GB" dirty="0"/>
+              <a:t>Figure 4: Comparison of Mean Relative Absolute Error (</a:t>
+            </a:r>
+            <a:r>
+              <a:rPr lang="en-GB" dirty="0" err="1"/>
+              <a:t>MRAEf</a:t>
+            </a:r>
+            <a:r>
+              <a:rPr lang="en-GB" dirty="0"/>
+              <a:t>) of different forecasting methods predicting the returns of 22 US stocks through 2020 per forecast distance.</a:t>
+            </a:r>
+          </a:p>
+        </p:txBody>
+      </p:sp>
+      <p:pic>
+        <p:nvPicPr>
+          <p:cNvPr id="11" name="Picture 10">
+            <a:extLst>
+              <a:ext uri="{FF2B5EF4-FFF2-40B4-BE49-F238E27FC236}">
+                <a16:creationId xmlns:a16="http://schemas.microsoft.com/office/drawing/2014/main" id="{A3E044D5-A9A3-0EC8-A2A1-547DE7DFACE3}"/>
+              </a:ext>
+            </a:extLst>
+          </p:cNvPr>
+          <p:cNvPicPr>
+            <a:picLocks noChangeAspect="1"/>
+          </p:cNvPicPr>
+          <p:nvPr/>
+        </p:nvPicPr>
+        <p:blipFill rotWithShape="1">
+          <a:blip r:embed="rId6"/>
+          <a:srcRect b="8993"/>
+          <a:stretch/>
+        </p:blipFill>
+        <p:spPr>
+          <a:xfrm>
+            <a:off x="8831481" y="21110663"/>
+            <a:ext cx="5486612" cy="3437383"/>
+          </a:xfrm>
+          <a:prstGeom prst="rect">
+            <a:avLst/>
+          </a:prstGeom>
+        </p:spPr>
+      </p:pic>
+      <p:pic>
+        <p:nvPicPr>
+          <p:cNvPr id="123" name="Picture 122">
+            <a:extLst>
+              <a:ext uri="{FF2B5EF4-FFF2-40B4-BE49-F238E27FC236}">
+                <a16:creationId xmlns:a16="http://schemas.microsoft.com/office/drawing/2014/main" id="{F35699CC-FAFB-C22D-9D59-0CA9EC895F21}"/>
+              </a:ext>
+            </a:extLst>
+          </p:cNvPr>
+          <p:cNvPicPr>
+            <a:picLocks noChangeAspect="1"/>
+          </p:cNvPicPr>
+          <p:nvPr/>
+        </p:nvPicPr>
+        <p:blipFill rotWithShape="1">
+          <a:blip r:embed="rId7">
+            <a:clrChange>
+              <a:clrFrom>
+                <a:srgbClr val="FFFFFF"/>
+              </a:clrFrom>
+              <a:clrTo>
+                <a:srgbClr val="FFFFFF">
+                  <a:alpha val="0"/>
+                </a:srgbClr>
+              </a:clrTo>
+            </a:clrChange>
+          </a:blip>
+          <a:srcRect t="2381"/>
+          <a:stretch/>
+        </p:blipFill>
+        <p:spPr>
+          <a:xfrm>
+            <a:off x="8729259" y="24552601"/>
+            <a:ext cx="5576134" cy="3381401"/>
+          </a:xfrm>
+          <a:prstGeom prst="rect">
+            <a:avLst/>
+          </a:prstGeom>
+        </p:spPr>
+      </p:pic>
       <p:sp>
         <p:nvSpPr>
           <p:cNvPr id="39" name="TextBox 38">
@@ -6603,10 +6462,10 @@
       </p:sp>
       <p:grpSp>
         <p:nvGrpSpPr>
-          <p:cNvPr id="68" name="Group 67">
+          <p:cNvPr id="85" name="Group 84">
             <a:extLst>
               <a:ext uri="{FF2B5EF4-FFF2-40B4-BE49-F238E27FC236}">
-                <a16:creationId xmlns:a16="http://schemas.microsoft.com/office/drawing/2014/main" id="{3BD11261-1C39-BEBC-1EF8-E17D03B75342}"/>
+                <a16:creationId xmlns:a16="http://schemas.microsoft.com/office/drawing/2014/main" id="{8B91B649-CA0A-3FDD-D6A5-2F3D936A224D}"/>
               </a:ext>
             </a:extLst>
           </p:cNvPr>
@@ -6615,7 +6474,973 @@
         </p:nvGrpSpPr>
         <p:grpSpPr>
           <a:xfrm>
-            <a:off x="8382078" y="16789902"/>
+            <a:off x="409941" y="21341509"/>
+            <a:ext cx="7842796" cy="3090402"/>
+            <a:chOff x="409941" y="21704361"/>
+            <a:chExt cx="7842796" cy="3090402"/>
+          </a:xfrm>
+        </p:grpSpPr>
+        <p:grpSp>
+          <p:nvGrpSpPr>
+            <p:cNvPr id="34" name="Group 33">
+              <a:extLst>
+                <a:ext uri="{FF2B5EF4-FFF2-40B4-BE49-F238E27FC236}">
+                  <a16:creationId xmlns:a16="http://schemas.microsoft.com/office/drawing/2014/main" id="{29B25EBF-B3CC-699B-AC72-8F0D82AA1CE8}"/>
+                </a:ext>
+              </a:extLst>
+            </p:cNvPr>
+            <p:cNvGrpSpPr/>
+            <p:nvPr/>
+          </p:nvGrpSpPr>
+          <p:grpSpPr>
+            <a:xfrm>
+              <a:off x="409941" y="21704361"/>
+              <a:ext cx="7458403" cy="2111323"/>
+              <a:chOff x="620807" y="19901782"/>
+              <a:chExt cx="7458403" cy="2111323"/>
+            </a:xfrm>
+          </p:grpSpPr>
+          <p:sp>
+            <p:nvSpPr>
+              <p:cNvPr id="33" name="Rectangle 32">
+                <a:extLst>
+                  <a:ext uri="{FF2B5EF4-FFF2-40B4-BE49-F238E27FC236}">
+                    <a16:creationId xmlns:a16="http://schemas.microsoft.com/office/drawing/2014/main" id="{2475048E-BF44-09BC-01B5-2930C12A0103}"/>
+                  </a:ext>
+                </a:extLst>
+              </p:cNvPr>
+              <p:cNvSpPr/>
+              <p:nvPr/>
+            </p:nvSpPr>
+            <p:spPr>
+              <a:xfrm>
+                <a:off x="620807" y="19901782"/>
+                <a:ext cx="7458403" cy="2111323"/>
+              </a:xfrm>
+              <a:prstGeom prst="rect">
+                <a:avLst/>
+              </a:prstGeom>
+              <a:noFill/>
+              <a:ln>
+                <a:noFill/>
+              </a:ln>
+            </p:spPr>
+            <p:style>
+              <a:lnRef idx="2">
+                <a:schemeClr val="accent1">
+                  <a:shade val="50000"/>
+                </a:schemeClr>
+              </a:lnRef>
+              <a:fillRef idx="1">
+                <a:schemeClr val="accent1"/>
+              </a:fillRef>
+              <a:effectRef idx="0">
+                <a:schemeClr val="accent1"/>
+              </a:effectRef>
+              <a:fontRef idx="minor">
+                <a:schemeClr val="lt1"/>
+              </a:fontRef>
+            </p:style>
+            <p:txBody>
+              <a:bodyPr rot="0" spcFirstLastPara="0" vertOverflow="overflow" horzOverflow="overflow" vert="horz" wrap="square" lIns="91440" tIns="45720" rIns="91440" bIns="45720" numCol="1" spcCol="0" rtlCol="0" fromWordArt="0" anchor="ctr" anchorCtr="0" forceAA="0" compatLnSpc="1">
+                <a:prstTxWarp prst="textNoShape">
+                  <a:avLst/>
+                </a:prstTxWarp>
+                <a:noAutofit/>
+              </a:bodyPr>
+              <a:lstStyle/>
+              <a:p>
+                <a:pPr algn="ctr"/>
+                <a:endParaRPr lang="en-GB" dirty="0"/>
+              </a:p>
+            </p:txBody>
+          </p:sp>
+          <p:pic>
+            <p:nvPicPr>
+              <p:cNvPr id="24" name="Picture 23">
+                <a:extLst>
+                  <a:ext uri="{FF2B5EF4-FFF2-40B4-BE49-F238E27FC236}">
+                    <a16:creationId xmlns:a16="http://schemas.microsoft.com/office/drawing/2014/main" id="{A5B5A3B3-A848-15EA-BD16-E03F737A302C}"/>
+                  </a:ext>
+                </a:extLst>
+              </p:cNvPr>
+              <p:cNvPicPr>
+                <a:picLocks noChangeAspect="1"/>
+              </p:cNvPicPr>
+              <p:nvPr/>
+            </p:nvPicPr>
+            <p:blipFill>
+              <a:blip r:embed="rId8">
+                <a:clrChange>
+                  <a:clrFrom>
+                    <a:srgbClr val="FFFFFF"/>
+                  </a:clrFrom>
+                  <a:clrTo>
+                    <a:srgbClr val="FFFFFF">
+                      <a:alpha val="0"/>
+                    </a:srgbClr>
+                  </a:clrTo>
+                </a:clrChange>
+              </a:blip>
+              <a:stretch>
+                <a:fillRect/>
+              </a:stretch>
+            </p:blipFill>
+            <p:spPr>
+              <a:xfrm>
+                <a:off x="649785" y="20003099"/>
+                <a:ext cx="7381816" cy="861493"/>
+              </a:xfrm>
+              <a:prstGeom prst="rect">
+                <a:avLst/>
+              </a:prstGeom>
+            </p:spPr>
+          </p:pic>
+          <p:pic>
+            <p:nvPicPr>
+              <p:cNvPr id="26" name="Picture 25">
+                <a:extLst>
+                  <a:ext uri="{FF2B5EF4-FFF2-40B4-BE49-F238E27FC236}">
+                    <a16:creationId xmlns:a16="http://schemas.microsoft.com/office/drawing/2014/main" id="{97A214E6-646F-3E83-D1C7-E099A5066A09}"/>
+                  </a:ext>
+                </a:extLst>
+              </p:cNvPr>
+              <p:cNvPicPr>
+                <a:picLocks noChangeAspect="1"/>
+              </p:cNvPicPr>
+              <p:nvPr/>
+            </p:nvPicPr>
+            <p:blipFill>
+              <a:blip r:embed="rId9">
+                <a:clrChange>
+                  <a:clrFrom>
+                    <a:srgbClr val="FFFFFF"/>
+                  </a:clrFrom>
+                  <a:clrTo>
+                    <a:srgbClr val="FFFFFF">
+                      <a:alpha val="0"/>
+                    </a:srgbClr>
+                  </a:clrTo>
+                </a:clrChange>
+              </a:blip>
+              <a:stretch>
+                <a:fillRect/>
+              </a:stretch>
+            </p:blipFill>
+            <p:spPr>
+              <a:xfrm>
+                <a:off x="1322735" y="20843948"/>
+                <a:ext cx="3916204" cy="569549"/>
+              </a:xfrm>
+              <a:prstGeom prst="rect">
+                <a:avLst/>
+              </a:prstGeom>
+            </p:spPr>
+          </p:pic>
+          <p:pic>
+            <p:nvPicPr>
+              <p:cNvPr id="28" name="Picture 27">
+                <a:extLst>
+                  <a:ext uri="{FF2B5EF4-FFF2-40B4-BE49-F238E27FC236}">
+                    <a16:creationId xmlns:a16="http://schemas.microsoft.com/office/drawing/2014/main" id="{4088B72F-7EEB-6771-A39F-AA73D6A2649E}"/>
+                  </a:ext>
+                </a:extLst>
+              </p:cNvPr>
+              <p:cNvPicPr>
+                <a:picLocks noChangeAspect="1"/>
+              </p:cNvPicPr>
+              <p:nvPr/>
+            </p:nvPicPr>
+            <p:blipFill>
+              <a:blip r:embed="rId10">
+                <a:clrChange>
+                  <a:clrFrom>
+                    <a:srgbClr val="FFFFFF"/>
+                  </a:clrFrom>
+                  <a:clrTo>
+                    <a:srgbClr val="FFFFFF">
+                      <a:alpha val="0"/>
+                    </a:srgbClr>
+                  </a:clrTo>
+                </a:clrChange>
+              </a:blip>
+              <a:stretch>
+                <a:fillRect/>
+              </a:stretch>
+            </p:blipFill>
+            <p:spPr>
+              <a:xfrm>
+                <a:off x="1514028" y="21452840"/>
+                <a:ext cx="3588720" cy="491365"/>
+              </a:xfrm>
+              <a:prstGeom prst="rect">
+                <a:avLst/>
+              </a:prstGeom>
+            </p:spPr>
+          </p:pic>
+          <p:sp>
+            <p:nvSpPr>
+              <p:cNvPr id="31" name="TextBox 30">
+                <a:extLst>
+                  <a:ext uri="{FF2B5EF4-FFF2-40B4-BE49-F238E27FC236}">
+                    <a16:creationId xmlns:a16="http://schemas.microsoft.com/office/drawing/2014/main" id="{E166E783-E372-4B6D-2C61-D7114711BC3D}"/>
+                  </a:ext>
+                </a:extLst>
+              </p:cNvPr>
+              <p:cNvSpPr txBox="1"/>
+              <p:nvPr/>
+            </p:nvSpPr>
+            <p:spPr>
+              <a:xfrm>
+                <a:off x="1034935" y="21075053"/>
+                <a:ext cx="362173" cy="307776"/>
+              </a:xfrm>
+              <a:prstGeom prst="rect">
+                <a:avLst/>
+              </a:prstGeom>
+              <a:noFill/>
+            </p:spPr>
+            <p:txBody>
+              <a:bodyPr wrap="square" lIns="0" tIns="0" rIns="0" bIns="0" rtlCol="0">
+                <a:noAutofit/>
+              </a:bodyPr>
+              <a:lstStyle/>
+              <a:p>
+                <a:pPr algn="l">
+                  <a:lnSpc>
+                    <a:spcPct val="90000"/>
+                  </a:lnSpc>
+                </a:pPr>
+                <a:r>
+                  <a:rPr lang="en-US" dirty="0" err="1"/>
+                  <a:t>s.t.</a:t>
+                </a:r>
+                <a:r>
+                  <a:rPr lang="en-US" dirty="0"/>
+                  <a:t>,</a:t>
+                </a:r>
+                <a:endParaRPr lang="en-GB" dirty="0"/>
+              </a:p>
+            </p:txBody>
+          </p:sp>
+          <p:sp>
+            <p:nvSpPr>
+              <p:cNvPr id="32" name="TextBox 31">
+                <a:extLst>
+                  <a:ext uri="{FF2B5EF4-FFF2-40B4-BE49-F238E27FC236}">
+                    <a16:creationId xmlns:a16="http://schemas.microsoft.com/office/drawing/2014/main" id="{3596F0E7-04A0-06B2-E1C8-32532047092A}"/>
+                  </a:ext>
+                </a:extLst>
+              </p:cNvPr>
+              <p:cNvSpPr txBox="1"/>
+              <p:nvPr/>
+            </p:nvSpPr>
+            <p:spPr>
+              <a:xfrm>
+                <a:off x="683063" y="19901782"/>
+                <a:ext cx="517087" cy="307776"/>
+              </a:xfrm>
+              <a:prstGeom prst="rect">
+                <a:avLst/>
+              </a:prstGeom>
+              <a:noFill/>
+            </p:spPr>
+            <p:txBody>
+              <a:bodyPr wrap="square" lIns="0" tIns="0" rIns="0" bIns="0" rtlCol="0">
+                <a:noAutofit/>
+              </a:bodyPr>
+              <a:lstStyle/>
+              <a:p>
+                <a:pPr algn="l">
+                  <a:lnSpc>
+                    <a:spcPct val="90000"/>
+                  </a:lnSpc>
+                </a:pPr>
+                <a:r>
+                  <a:rPr lang="en-US" dirty="0"/>
+                  <a:t>OCP</a:t>
+                </a:r>
+                <a:endParaRPr lang="en-GB" dirty="0"/>
+              </a:p>
+            </p:txBody>
+          </p:sp>
+        </p:grpSp>
+        <p:sp>
+          <p:nvSpPr>
+            <p:cNvPr id="69" name="TextBox 68">
+              <a:extLst>
+                <a:ext uri="{FF2B5EF4-FFF2-40B4-BE49-F238E27FC236}">
+                  <a16:creationId xmlns:a16="http://schemas.microsoft.com/office/drawing/2014/main" id="{D55544B8-DC83-94AE-6521-1FC273D4EECE}"/>
+                </a:ext>
+              </a:extLst>
+            </p:cNvPr>
+            <p:cNvSpPr txBox="1"/>
+            <p:nvPr/>
+          </p:nvSpPr>
+          <p:spPr>
+            <a:xfrm>
+              <a:off x="7878594" y="22502538"/>
+              <a:ext cx="374143" cy="750187"/>
+            </a:xfrm>
+            <a:prstGeom prst="rect">
+              <a:avLst/>
+            </a:prstGeom>
+            <a:noFill/>
+          </p:spPr>
+          <p:txBody>
+            <a:bodyPr wrap="square" lIns="0" tIns="0" rIns="0" bIns="0" rtlCol="0">
+              <a:noAutofit/>
+            </a:bodyPr>
+            <a:lstStyle/>
+            <a:p>
+              <a:pPr algn="l">
+                <a:lnSpc>
+                  <a:spcPct val="90000"/>
+                </a:lnSpc>
+              </a:pPr>
+              <a:r>
+                <a:rPr lang="en-US" sz="1700" dirty="0"/>
+                <a:t>(1)</a:t>
+              </a:r>
+              <a:endParaRPr lang="en-GB" sz="1700" dirty="0"/>
+            </a:p>
+          </p:txBody>
+        </p:sp>
+        <mc:AlternateContent xmlns:mc="http://schemas.openxmlformats.org/markup-compatibility/2006">
+          <mc:Choice xmlns:a14="http://schemas.microsoft.com/office/drawing/2010/main" Requires="a14">
+            <p:sp>
+              <p:nvSpPr>
+                <p:cNvPr id="70" name="TextBox 69">
+                  <a:extLst>
+                    <a:ext uri="{FF2B5EF4-FFF2-40B4-BE49-F238E27FC236}">
+                      <a16:creationId xmlns:a16="http://schemas.microsoft.com/office/drawing/2014/main" id="{EE41779E-8DFD-09D6-72AE-F688CBA67656}"/>
+                    </a:ext>
+                  </a:extLst>
+                </p:cNvPr>
+                <p:cNvSpPr txBox="1"/>
+                <p:nvPr/>
+              </p:nvSpPr>
+              <p:spPr>
+                <a:xfrm>
+                  <a:off x="572269" y="23880363"/>
+                  <a:ext cx="4346250" cy="914400"/>
+                </a:xfrm>
+                <a:prstGeom prst="rect">
+                  <a:avLst/>
+                </a:prstGeom>
+                <a:noFill/>
+              </p:spPr>
+              <p:txBody>
+                <a:bodyPr wrap="none" lIns="0" tIns="0" rIns="0" bIns="0" rtlCol="0">
+                  <a:noAutofit/>
+                </a:bodyPr>
+                <a:lstStyle/>
+                <a:p>
+                  <a:pPr>
+                    <a:lnSpc>
+                      <a:spcPct val="90000"/>
+                    </a:lnSpc>
+                  </a:pPr>
+                  <a14:m>
+                    <m:oMath xmlns:m="http://schemas.openxmlformats.org/officeDocument/2006/math">
+                      <m:sSub>
+                        <m:sSubPr>
+                          <m:ctrlPr>
+                            <a:rPr lang="en-US" sz="1700" i="1">
+                              <a:latin typeface="Cambria Math" panose="02040503050406030204" pitchFamily="18" charset="0"/>
+                            </a:rPr>
+                          </m:ctrlPr>
+                        </m:sSubPr>
+                        <m:e>
+                          <m:r>
+                            <a:rPr lang="en-US" sz="1700" i="1">
+                              <a:latin typeface="Cambria Math" panose="02040503050406030204" pitchFamily="18" charset="0"/>
+                            </a:rPr>
+                            <m:t>𝜋</m:t>
+                          </m:r>
+                        </m:e>
+                        <m:sub>
+                          <m:r>
+                            <a:rPr lang="en-US" sz="1700" i="1">
+                              <a:latin typeface="Cambria Math" panose="02040503050406030204" pitchFamily="18" charset="0"/>
+                            </a:rPr>
+                            <m:t>𝜏</m:t>
+                          </m:r>
+                        </m:sub>
+                      </m:sSub>
+                    </m:oMath>
+                  </a14:m>
+                  <a:r>
+                    <a:rPr lang="en-GB" sz="1700" dirty="0"/>
+                    <a:t>: Portfolio distribution at time </a:t>
+                  </a:r>
+                  <a14:m>
+                    <m:oMath xmlns:m="http://schemas.openxmlformats.org/officeDocument/2006/math">
+                      <m:r>
+                        <a:rPr lang="en-US" sz="1700" i="1">
+                          <a:latin typeface="Cambria Math" panose="02040503050406030204" pitchFamily="18" charset="0"/>
+                        </a:rPr>
+                        <m:t>𝜏</m:t>
+                      </m:r>
+                    </m:oMath>
+                  </a14:m>
+                  <a:endParaRPr lang="en-US" sz="1700" dirty="0"/>
+                </a:p>
+                <a:p>
+                  <a:pPr>
+                    <a:lnSpc>
+                      <a:spcPct val="90000"/>
+                    </a:lnSpc>
+                  </a:pPr>
+                  <a14:m>
+                    <m:oMath xmlns:m="http://schemas.openxmlformats.org/officeDocument/2006/math">
+                      <m:sSub>
+                        <m:sSubPr>
+                          <m:ctrlPr>
+                            <a:rPr lang="en-US" sz="1700" i="1">
+                              <a:latin typeface="Cambria Math" panose="02040503050406030204" pitchFamily="18" charset="0"/>
+                            </a:rPr>
+                          </m:ctrlPr>
+                        </m:sSubPr>
+                        <m:e>
+                          <m:acc>
+                            <m:accPr>
+                              <m:chr m:val="̂"/>
+                              <m:ctrlPr>
+                                <a:rPr lang="en-US" sz="1700" i="1">
+                                  <a:latin typeface="Cambria Math" panose="02040503050406030204" pitchFamily="18" charset="0"/>
+                                </a:rPr>
+                              </m:ctrlPr>
+                            </m:accPr>
+                            <m:e>
+                              <m:r>
+                                <a:rPr lang="en-US" sz="1700" i="1">
+                                  <a:latin typeface="Cambria Math" panose="02040503050406030204" pitchFamily="18" charset="0"/>
+                                </a:rPr>
+                                <m:t>𝑟</m:t>
+                              </m:r>
+                            </m:e>
+                          </m:acc>
+                        </m:e>
+                        <m:sub>
+                          <m:r>
+                            <a:rPr lang="en-US" sz="1700" i="1">
+                              <a:latin typeface="Cambria Math" panose="02040503050406030204" pitchFamily="18" charset="0"/>
+                            </a:rPr>
+                            <m:t>𝜏</m:t>
+                          </m:r>
+                          <m:r>
+                            <a:rPr lang="en-US" sz="1700" i="1">
+                              <a:latin typeface="Cambria Math" panose="02040503050406030204" pitchFamily="18" charset="0"/>
+                            </a:rPr>
+                            <m:t>|</m:t>
+                          </m:r>
+                          <m:r>
+                            <a:rPr lang="en-US" sz="1700" i="1">
+                              <a:latin typeface="Cambria Math" panose="02040503050406030204" pitchFamily="18" charset="0"/>
+                            </a:rPr>
+                            <m:t>𝑡</m:t>
+                          </m:r>
+                        </m:sub>
+                      </m:sSub>
+                    </m:oMath>
+                  </a14:m>
+                  <a:r>
+                    <a:rPr lang="en-GB" sz="1700" dirty="0"/>
+                    <a:t>: Expected return at time </a:t>
+                  </a:r>
+                  <a14:m>
+                    <m:oMath xmlns:m="http://schemas.openxmlformats.org/officeDocument/2006/math">
+                      <m:r>
+                        <a:rPr lang="en-US" sz="1700" i="1">
+                          <a:latin typeface="Cambria Math" panose="02040503050406030204" pitchFamily="18" charset="0"/>
+                        </a:rPr>
+                        <m:t>𝜏</m:t>
+                      </m:r>
+                    </m:oMath>
+                  </a14:m>
+                  <a:r>
+                    <a:rPr lang="en-GB" sz="1700" dirty="0"/>
+                    <a:t> as of time t</a:t>
+                  </a:r>
+                </a:p>
+                <a:p>
+                  <a:pPr>
+                    <a:lnSpc>
+                      <a:spcPct val="90000"/>
+                    </a:lnSpc>
+                  </a:pPr>
+                  <a14:m>
+                    <m:oMath xmlns:m="http://schemas.openxmlformats.org/officeDocument/2006/math">
+                      <m:sSub>
+                        <m:sSubPr>
+                          <m:ctrlPr>
+                            <a:rPr lang="en-US" sz="1700" i="1">
+                              <a:latin typeface="Cambria Math" panose="02040503050406030204" pitchFamily="18" charset="0"/>
+                            </a:rPr>
+                          </m:ctrlPr>
+                        </m:sSubPr>
+                        <m:e>
+                          <m:acc>
+                            <m:accPr>
+                              <m:chr m:val="̂"/>
+                              <m:ctrlPr>
+                                <a:rPr lang="en-US" sz="1700" i="1">
+                                  <a:latin typeface="Cambria Math" panose="02040503050406030204" pitchFamily="18" charset="0"/>
+                                </a:rPr>
+                              </m:ctrlPr>
+                            </m:accPr>
+                            <m:e>
+                              <m:r>
+                                <m:rPr>
+                                  <m:sty m:val="p"/>
+                                </m:rPr>
+                                <a:rPr lang="en-US" sz="1700">
+                                  <a:latin typeface="Cambria Math" panose="02040503050406030204" pitchFamily="18" charset="0"/>
+                                </a:rPr>
+                                <m:t>Σ</m:t>
+                              </m:r>
+                            </m:e>
+                          </m:acc>
+                        </m:e>
+                        <m:sub>
+                          <m:r>
+                            <a:rPr lang="en-US" sz="1700" i="1">
+                              <a:latin typeface="Cambria Math" panose="02040503050406030204" pitchFamily="18" charset="0"/>
+                            </a:rPr>
+                            <m:t>𝜏</m:t>
+                          </m:r>
+                          <m:r>
+                            <a:rPr lang="en-US" sz="1700" i="1">
+                              <a:latin typeface="Cambria Math" panose="02040503050406030204" pitchFamily="18" charset="0"/>
+                            </a:rPr>
+                            <m:t>|</m:t>
+                          </m:r>
+                          <m:r>
+                            <a:rPr lang="en-US" sz="1700" i="1">
+                              <a:latin typeface="Cambria Math" panose="02040503050406030204" pitchFamily="18" charset="0"/>
+                            </a:rPr>
+                            <m:t>𝑡</m:t>
+                          </m:r>
+                        </m:sub>
+                      </m:sSub>
+                    </m:oMath>
+                  </a14:m>
+                  <a:r>
+                    <a:rPr lang="en-GB" sz="1700" dirty="0"/>
+                    <a:t>: Covariance matrix at time </a:t>
+                  </a:r>
+                  <a14:m>
+                    <m:oMath xmlns:m="http://schemas.openxmlformats.org/officeDocument/2006/math">
+                      <m:r>
+                        <a:rPr lang="en-US" sz="1700" i="1">
+                          <a:latin typeface="Cambria Math" panose="02040503050406030204" pitchFamily="18" charset="0"/>
+                        </a:rPr>
+                        <m:t>𝜏</m:t>
+                      </m:r>
+                      <m:r>
+                        <a:rPr lang="en-US" sz="1700" i="1">
+                          <a:latin typeface="Cambria Math" panose="02040503050406030204" pitchFamily="18" charset="0"/>
+                        </a:rPr>
+                        <m:t> </m:t>
+                      </m:r>
+                    </m:oMath>
+                  </a14:m>
+                  <a:r>
+                    <a:rPr lang="en-GB" sz="1700" dirty="0"/>
+                    <a:t>as of time t</a:t>
+                  </a:r>
+                </a:p>
+                <a:p>
+                  <a:pPr>
+                    <a:lnSpc>
+                      <a:spcPct val="90000"/>
+                    </a:lnSpc>
+                  </a:pPr>
+                  <a:endParaRPr lang="en-US" sz="1700" dirty="0"/>
+                </a:p>
+                <a:p>
+                  <a:pPr>
+                    <a:lnSpc>
+                      <a:spcPct val="90000"/>
+                    </a:lnSpc>
+                  </a:pPr>
+                  <a:endParaRPr lang="en-US" sz="1700" dirty="0"/>
+                </a:p>
+                <a:p>
+                  <a:pPr>
+                    <a:lnSpc>
+                      <a:spcPct val="90000"/>
+                    </a:lnSpc>
+                  </a:pPr>
+                  <a:endParaRPr lang="en-GB" sz="1700" dirty="0"/>
+                </a:p>
+                <a:p>
+                  <a:pPr>
+                    <a:lnSpc>
+                      <a:spcPct val="90000"/>
+                    </a:lnSpc>
+                  </a:pPr>
+                  <a:endParaRPr lang="en-GB" sz="1700" dirty="0"/>
+                </a:p>
+                <a:p>
+                  <a:pPr>
+                    <a:lnSpc>
+                      <a:spcPct val="90000"/>
+                    </a:lnSpc>
+                  </a:pPr>
+                  <a:endParaRPr lang="en-GB" sz="1700" dirty="0"/>
+                </a:p>
+              </p:txBody>
+            </p:sp>
+          </mc:Choice>
+          <mc:Fallback>
+            <p:sp>
+              <p:nvSpPr>
+                <p:cNvPr id="70" name="TextBox 69">
+                  <a:extLst>
+                    <a:ext uri="{FF2B5EF4-FFF2-40B4-BE49-F238E27FC236}">
+                      <a16:creationId xmlns:a16="http://schemas.microsoft.com/office/drawing/2014/main" id="{EE41779E-8DFD-09D6-72AE-F688CBA67656}"/>
+                    </a:ext>
+                  </a:extLst>
+                </p:cNvPr>
+                <p:cNvSpPr txBox="1">
+                  <a:spLocks noRot="1" noChangeAspect="1" noMove="1" noResize="1" noEditPoints="1" noAdjustHandles="1" noChangeArrowheads="1" noChangeShapeType="1" noTextEdit="1"/>
+                </p:cNvSpPr>
+                <p:nvPr/>
+              </p:nvSpPr>
+              <p:spPr>
+                <a:xfrm>
+                  <a:off x="572269" y="23880363"/>
+                  <a:ext cx="4346250" cy="914400"/>
+                </a:xfrm>
+                <a:prstGeom prst="rect">
+                  <a:avLst/>
+                </a:prstGeom>
+                <a:blipFill>
+                  <a:blip r:embed="rId11"/>
+                  <a:stretch>
+                    <a:fillRect l="-1823" t="-10000"/>
+                  </a:stretch>
+                </a:blipFill>
+              </p:spPr>
+              <p:txBody>
+                <a:bodyPr/>
+                <a:lstStyle/>
+                <a:p>
+                  <a:r>
+                    <a:rPr lang="en-GB">
+                      <a:noFill/>
+                    </a:rPr>
+                    <a:t> </a:t>
+                  </a:r>
+                </a:p>
+              </p:txBody>
+            </p:sp>
+          </mc:Fallback>
+        </mc:AlternateContent>
+        <mc:AlternateContent xmlns:mc="http://schemas.openxmlformats.org/markup-compatibility/2006">
+          <mc:Choice xmlns:a14="http://schemas.microsoft.com/office/drawing/2010/main" Requires="a14">
+            <p:sp>
+              <p:nvSpPr>
+                <p:cNvPr id="72" name="TextBox 71">
+                  <a:extLst>
+                    <a:ext uri="{FF2B5EF4-FFF2-40B4-BE49-F238E27FC236}">
+                      <a16:creationId xmlns:a16="http://schemas.microsoft.com/office/drawing/2014/main" id="{DA689300-C4DE-4441-23FF-942156BBCCF5}"/>
+                    </a:ext>
+                  </a:extLst>
+                </p:cNvPr>
+                <p:cNvSpPr txBox="1"/>
+                <p:nvPr/>
+              </p:nvSpPr>
+              <p:spPr>
+                <a:xfrm>
+                  <a:off x="4910932" y="23880363"/>
+                  <a:ext cx="2813182" cy="810478"/>
+                </a:xfrm>
+                <a:prstGeom prst="rect">
+                  <a:avLst/>
+                </a:prstGeom>
+                <a:noFill/>
+              </p:spPr>
+              <p:txBody>
+                <a:bodyPr wrap="square">
+                  <a:spAutoFit/>
+                </a:bodyPr>
+                <a:lstStyle/>
+                <a:p>
+                  <a:pPr>
+                    <a:lnSpc>
+                      <a:spcPct val="90000"/>
+                    </a:lnSpc>
+                  </a:pPr>
+                  <a14:m>
+                    <m:oMath xmlns:m="http://schemas.openxmlformats.org/officeDocument/2006/math">
+                      <m:r>
+                        <a:rPr lang="en-US" sz="1700" i="1">
+                          <a:latin typeface="Cambria Math" panose="02040503050406030204" pitchFamily="18" charset="0"/>
+                        </a:rPr>
+                        <m:t>𝐻</m:t>
+                      </m:r>
+                    </m:oMath>
+                  </a14:m>
+                  <a:r>
+                    <a:rPr lang="en-GB" sz="1700" dirty="0"/>
+                    <a:t>: </a:t>
+                  </a:r>
+                  <a:r>
+                    <a:rPr lang="en-US" sz="1700" dirty="0"/>
+                    <a:t>Horizon</a:t>
+                  </a:r>
+                </a:p>
+                <a:p>
+                  <a:pPr>
+                    <a:lnSpc>
+                      <a:spcPct val="90000"/>
+                    </a:lnSpc>
+                  </a:pPr>
+                  <a14:m>
+                    <m:oMath xmlns:m="http://schemas.openxmlformats.org/officeDocument/2006/math">
+                      <m:sSup>
+                        <m:sSupPr>
+                          <m:ctrlPr>
+                            <a:rPr lang="en-US" sz="1700" i="1">
+                              <a:latin typeface="Cambria Math" panose="02040503050406030204" pitchFamily="18" charset="0"/>
+                            </a:rPr>
+                          </m:ctrlPr>
+                        </m:sSupPr>
+                        <m:e>
+                          <m:r>
+                            <a:rPr lang="en-US" sz="1700" i="1">
+                              <a:latin typeface="Cambria Math" panose="02040503050406030204" pitchFamily="18" charset="0"/>
+                            </a:rPr>
+                            <m:t>𝛾</m:t>
+                          </m:r>
+                        </m:e>
+                        <m:sup>
+                          <m:r>
+                            <a:rPr lang="en-US" sz="1700" i="1">
+                              <a:latin typeface="Cambria Math" panose="02040503050406030204" pitchFamily="18" charset="0"/>
+                            </a:rPr>
+                            <m:t>𝑟𝑖𝑠𝑘</m:t>
+                          </m:r>
+                        </m:sup>
+                      </m:sSup>
+                    </m:oMath>
+                  </a14:m>
+                  <a:r>
+                    <a:rPr lang="en-GB" sz="1700" dirty="0"/>
+                    <a:t>: </a:t>
+                  </a:r>
+                  <a:r>
+                    <a:rPr lang="en-US" sz="1700" dirty="0"/>
+                    <a:t>Risk weight factor</a:t>
+                  </a:r>
+                </a:p>
+                <a:p>
+                  <a:pPr>
+                    <a:lnSpc>
+                      <a:spcPct val="90000"/>
+                    </a:lnSpc>
+                  </a:pPr>
+                  <a14:m>
+                    <m:oMath xmlns:m="http://schemas.openxmlformats.org/officeDocument/2006/math">
+                      <m:sSup>
+                        <m:sSupPr>
+                          <m:ctrlPr>
+                            <a:rPr lang="en-US" sz="1700" i="1">
+                              <a:latin typeface="Cambria Math" panose="02040503050406030204" pitchFamily="18" charset="0"/>
+                            </a:rPr>
+                          </m:ctrlPr>
+                        </m:sSupPr>
+                        <m:e>
+                          <m:r>
+                            <a:rPr lang="en-US" sz="1700" i="1">
+                              <a:latin typeface="Cambria Math" panose="02040503050406030204" pitchFamily="18" charset="0"/>
+                            </a:rPr>
+                            <m:t>𝛾</m:t>
+                          </m:r>
+                        </m:e>
+                        <m:sup>
+                          <m:r>
+                            <a:rPr lang="en-US" sz="1700" i="1">
+                              <a:latin typeface="Cambria Math" panose="02040503050406030204" pitchFamily="18" charset="0"/>
+                            </a:rPr>
+                            <m:t>𝑡𝑟𝑎𝑑𝑒</m:t>
+                          </m:r>
+                        </m:sup>
+                      </m:sSup>
+                    </m:oMath>
+                  </a14:m>
+                  <a:r>
+                    <a:rPr lang="en-GB" sz="1700" dirty="0"/>
+                    <a:t>: </a:t>
+                  </a:r>
+                  <a:r>
+                    <a:rPr lang="en-US" sz="1700" dirty="0"/>
+                    <a:t>Sell/buy cost</a:t>
+                  </a:r>
+                </a:p>
+              </p:txBody>
+            </p:sp>
+          </mc:Choice>
+          <mc:Fallback>
+            <p:sp>
+              <p:nvSpPr>
+                <p:cNvPr id="72" name="TextBox 71">
+                  <a:extLst>
+                    <a:ext uri="{FF2B5EF4-FFF2-40B4-BE49-F238E27FC236}">
+                      <a16:creationId xmlns:a16="http://schemas.microsoft.com/office/drawing/2014/main" id="{DA689300-C4DE-4441-23FF-942156BBCCF5}"/>
+                    </a:ext>
+                  </a:extLst>
+                </p:cNvPr>
+                <p:cNvSpPr txBox="1">
+                  <a:spLocks noRot="1" noChangeAspect="1" noMove="1" noResize="1" noEditPoints="1" noAdjustHandles="1" noChangeArrowheads="1" noChangeShapeType="1" noTextEdit="1"/>
+                </p:cNvSpPr>
+                <p:nvPr/>
+              </p:nvSpPr>
+              <p:spPr>
+                <a:xfrm>
+                  <a:off x="4910932" y="23880363"/>
+                  <a:ext cx="2813182" cy="810478"/>
+                </a:xfrm>
+                <a:prstGeom prst="rect">
+                  <a:avLst/>
+                </a:prstGeom>
+                <a:blipFill>
+                  <a:blip r:embed="rId12"/>
+                  <a:stretch>
+                    <a:fillRect t="-6015" b="-9774"/>
+                  </a:stretch>
+                </a:blipFill>
+              </p:spPr>
+              <p:txBody>
+                <a:bodyPr/>
+                <a:lstStyle/>
+                <a:p>
+                  <a:r>
+                    <a:rPr lang="en-GB">
+                      <a:noFill/>
+                    </a:rPr>
+                    <a:t> </a:t>
+                  </a:r>
+                </a:p>
+              </p:txBody>
+            </p:sp>
+          </mc:Fallback>
+        </mc:AlternateContent>
+      </p:grpSp>
+      <p:pic>
+        <p:nvPicPr>
+          <p:cNvPr id="76" name="Picture 75" descr="A qr code with a graph and candlestick chart&#10;&#10;Description automatically generated">
+            <a:extLst>
+              <a:ext uri="{FF2B5EF4-FFF2-40B4-BE49-F238E27FC236}">
+                <a16:creationId xmlns:a16="http://schemas.microsoft.com/office/drawing/2014/main" id="{03CA65C1-F594-993D-D80A-545219561D06}"/>
+              </a:ext>
+            </a:extLst>
+          </p:cNvPr>
+          <p:cNvPicPr>
+            <a:picLocks noChangeAspect="1"/>
+          </p:cNvPicPr>
+          <p:nvPr/>
+        </p:nvPicPr>
+        <p:blipFill>
+          <a:blip r:embed="rId13">
+            <a:extLst>
+              <a:ext uri="{28A0092B-C50C-407E-A947-70E740481C1C}">
+                <a14:useLocalDpi xmlns:a14="http://schemas.microsoft.com/office/drawing/2010/main" val="0"/>
+              </a:ext>
+            </a:extLst>
+          </a:blip>
+          <a:stretch>
+            <a:fillRect/>
+          </a:stretch>
+        </p:blipFill>
+        <p:spPr>
+          <a:xfrm>
+            <a:off x="6500427" y="6264480"/>
+            <a:ext cx="1300904" cy="1300904"/>
+          </a:xfrm>
+          <a:prstGeom prst="rect">
+            <a:avLst/>
+          </a:prstGeom>
+        </p:spPr>
+      </p:pic>
+      <p:pic>
+        <p:nvPicPr>
+          <p:cNvPr id="7" name="Picture 6">
+            <a:extLst>
+              <a:ext uri="{FF2B5EF4-FFF2-40B4-BE49-F238E27FC236}">
+                <a16:creationId xmlns:a16="http://schemas.microsoft.com/office/drawing/2014/main" id="{46F2FBCE-0647-9B49-39D2-82A07FEF3A4A}"/>
+              </a:ext>
+            </a:extLst>
+          </p:cNvPr>
+          <p:cNvPicPr>
+            <a:picLocks noChangeAspect="1"/>
+          </p:cNvPicPr>
+          <p:nvPr/>
+        </p:nvPicPr>
+        <p:blipFill>
+          <a:blip r:embed="rId14"/>
+          <a:stretch>
+            <a:fillRect/>
+          </a:stretch>
+        </p:blipFill>
+        <p:spPr>
+          <a:xfrm>
+            <a:off x="24930636" y="14717603"/>
+            <a:ext cx="6269756" cy="3521370"/>
+          </a:xfrm>
+          <a:prstGeom prst="rect">
+            <a:avLst/>
+          </a:prstGeom>
+        </p:spPr>
+      </p:pic>
+      <p:pic>
+        <p:nvPicPr>
+          <p:cNvPr id="10" name="Picture 9">
+            <a:extLst>
+              <a:ext uri="{FF2B5EF4-FFF2-40B4-BE49-F238E27FC236}">
+                <a16:creationId xmlns:a16="http://schemas.microsoft.com/office/drawing/2014/main" id="{092280C1-9962-C322-6810-0DEE264796CE}"/>
+              </a:ext>
+            </a:extLst>
+          </p:cNvPr>
+          <p:cNvPicPr>
+            <a:picLocks noChangeAspect="1"/>
+          </p:cNvPicPr>
+          <p:nvPr/>
+        </p:nvPicPr>
+        <p:blipFill>
+          <a:blip r:embed="rId15"/>
+          <a:stretch>
+            <a:fillRect/>
+          </a:stretch>
+        </p:blipFill>
+        <p:spPr>
+          <a:xfrm>
+            <a:off x="24029575" y="19630449"/>
+            <a:ext cx="5578979" cy="3397764"/>
+          </a:xfrm>
+          <a:prstGeom prst="rect">
+            <a:avLst/>
+          </a:prstGeom>
+        </p:spPr>
+      </p:pic>
+      <p:grpSp>
+        <p:nvGrpSpPr>
+          <p:cNvPr id="18" name="Group 17">
+            <a:extLst>
+              <a:ext uri="{FF2B5EF4-FFF2-40B4-BE49-F238E27FC236}">
+                <a16:creationId xmlns:a16="http://schemas.microsoft.com/office/drawing/2014/main" id="{0D5C0E2D-E8A3-5D2C-5DB1-4F28FC3AFD8D}"/>
+              </a:ext>
+            </a:extLst>
+          </p:cNvPr>
+          <p:cNvGrpSpPr/>
+          <p:nvPr/>
+        </p:nvGrpSpPr>
+        <p:grpSpPr>
+          <a:xfrm>
+            <a:off x="-14663455" y="17457097"/>
             <a:ext cx="12253278" cy="6447075"/>
             <a:chOff x="8382078" y="16088862"/>
             <a:chExt cx="12253278" cy="6447075"/>
@@ -6623,10 +7448,10 @@
         </p:grpSpPr>
         <p:pic>
           <p:nvPicPr>
-            <p:cNvPr id="121" name="Picture 120">
+            <p:cNvPr id="20" name="Picture 19">
               <a:extLst>
                 <a:ext uri="{FF2B5EF4-FFF2-40B4-BE49-F238E27FC236}">
-                  <a16:creationId xmlns:a16="http://schemas.microsoft.com/office/drawing/2014/main" id="{8B366E01-E0D8-A42D-9AB2-59AAE0A9D3AC}"/>
+                  <a16:creationId xmlns:a16="http://schemas.microsoft.com/office/drawing/2014/main" id="{E7C43849-5558-859E-2A1D-E629ECC31A1A}"/>
                 </a:ext>
               </a:extLst>
             </p:cNvPr>
@@ -6636,7 +7461,7 @@
             <p:nvPr/>
           </p:nvPicPr>
           <p:blipFill>
-            <a:blip r:embed="rId8">
+            <a:blip r:embed="rId16">
               <a:clrChange>
                 <a:clrFrom>
                   <a:srgbClr val="FFFFFF"/>
@@ -6664,10 +7489,10 @@
         </p:pic>
         <p:sp>
           <p:nvSpPr>
-            <p:cNvPr id="124" name="Text Placeholder 8">
+            <p:cNvPr id="22" name="Text Placeholder 8">
               <a:extLst>
                 <a:ext uri="{FF2B5EF4-FFF2-40B4-BE49-F238E27FC236}">
-                  <a16:creationId xmlns:a16="http://schemas.microsoft.com/office/drawing/2014/main" id="{1D8E5475-A8D0-D336-0332-5A7FA9F3118B}"/>
+                  <a16:creationId xmlns:a16="http://schemas.microsoft.com/office/drawing/2014/main" id="{6023309D-52DC-E2AE-B064-ECDBBD1572A8}"/>
                 </a:ext>
               </a:extLst>
             </p:cNvPr>
@@ -6881,10 +7706,10 @@
         </p:sp>
         <p:pic>
           <p:nvPicPr>
-            <p:cNvPr id="45" name="Picture 44">
+            <p:cNvPr id="23" name="Picture 22">
               <a:extLst>
                 <a:ext uri="{FF2B5EF4-FFF2-40B4-BE49-F238E27FC236}">
-                  <a16:creationId xmlns:a16="http://schemas.microsoft.com/office/drawing/2014/main" id="{AD8626C8-CDB3-1315-E7F4-7C5656433BDD}"/>
+                  <a16:creationId xmlns:a16="http://schemas.microsoft.com/office/drawing/2014/main" id="{6F6173AD-8AF4-23C9-7077-68117A7BAC55}"/>
                 </a:ext>
               </a:extLst>
             </p:cNvPr>
@@ -6894,7 +7719,7 @@
             <p:nvPr/>
           </p:nvPicPr>
           <p:blipFill>
-            <a:blip r:embed="rId9">
+            <a:blip r:embed="rId17">
               <a:clrChange>
                 <a:clrFrom>
                   <a:srgbClr val="FFFFFF"/>
@@ -6921,12 +7746,270 @@
           </p:spPr>
         </p:pic>
       </p:grpSp>
+      <p:pic>
+        <p:nvPicPr>
+          <p:cNvPr id="25" name="Picture 24">
+            <a:extLst>
+              <a:ext uri="{FF2B5EF4-FFF2-40B4-BE49-F238E27FC236}">
+                <a16:creationId xmlns:a16="http://schemas.microsoft.com/office/drawing/2014/main" id="{F32A2575-B141-4F9B-7F47-291DD4BB0442}"/>
+              </a:ext>
+            </a:extLst>
+          </p:cNvPr>
+          <p:cNvPicPr>
+            <a:picLocks noChangeAspect="1"/>
+          </p:cNvPicPr>
+          <p:nvPr/>
+        </p:nvPicPr>
+        <p:blipFill>
+          <a:blip r:embed="rId16">
+            <a:clrChange>
+              <a:clrFrom>
+                <a:srgbClr val="FFFFFF"/>
+              </a:clrFrom>
+              <a:clrTo>
+                <a:srgbClr val="FFFFFF">
+                  <a:alpha val="0"/>
+                </a:srgbClr>
+              </a:clrTo>
+            </a:clrChange>
+          </a:blip>
+          <a:stretch>
+            <a:fillRect/>
+          </a:stretch>
+        </p:blipFill>
+        <p:spPr>
+          <a:xfrm>
+            <a:off x="8284072" y="16050409"/>
+            <a:ext cx="6269756" cy="4676621"/>
+          </a:xfrm>
+          <a:prstGeom prst="rect">
+            <a:avLst/>
+          </a:prstGeom>
+        </p:spPr>
+      </p:pic>
+      <p:sp>
+        <p:nvSpPr>
+          <p:cNvPr id="124" name="Text Placeholder 8">
+            <a:extLst>
+              <a:ext uri="{FF2B5EF4-FFF2-40B4-BE49-F238E27FC236}">
+                <a16:creationId xmlns:a16="http://schemas.microsoft.com/office/drawing/2014/main" id="{1D8E5475-A8D0-D336-0332-5A7FA9F3118B}"/>
+              </a:ext>
+            </a:extLst>
+          </p:cNvPr>
+          <p:cNvSpPr txBox="1">
+            <a:spLocks/>
+          </p:cNvSpPr>
+          <p:nvPr/>
+        </p:nvSpPr>
+        <p:spPr>
+          <a:xfrm>
+            <a:off x="8443226" y="20648069"/>
+            <a:ext cx="6165723" cy="642403"/>
+          </a:xfrm>
+          <a:prstGeom prst="rect">
+            <a:avLst/>
+          </a:prstGeom>
+        </p:spPr>
+        <p:txBody>
+          <a:bodyPr vert="horz" lIns="0" tIns="0" rIns="0" bIns="0" rtlCol="0">
+            <a:noAutofit/>
+          </a:bodyPr>
+          <a:lstStyle>
+            <a:lvl1pPr marL="0" indent="0" algn="l" defTabSz="2138314" rtl="0" eaLnBrk="1" latinLnBrk="0" hangingPunct="1">
+              <a:lnSpc>
+                <a:spcPct val="90000"/>
+              </a:lnSpc>
+              <a:spcBef>
+                <a:spcPts val="0"/>
+              </a:spcBef>
+              <a:spcAft>
+                <a:spcPts val="0"/>
+              </a:spcAft>
+              <a:buFont typeface="Arial" panose="020B0604020202020204" pitchFamily="34" charset="0"/>
+              <a:buNone/>
+              <a:defRPr sz="1200" i="1" kern="1200">
+                <a:solidFill>
+                  <a:schemeClr val="tx1"/>
+                </a:solidFill>
+                <a:latin typeface="+mn-lt"/>
+                <a:ea typeface="+mn-ea"/>
+                <a:cs typeface="+mn-cs"/>
+              </a:defRPr>
+            </a:lvl1pPr>
+            <a:lvl2pPr marL="0" indent="0" algn="l" defTabSz="2138314" rtl="0" eaLnBrk="1" latinLnBrk="0" hangingPunct="1">
+              <a:lnSpc>
+                <a:spcPct val="83000"/>
+              </a:lnSpc>
+              <a:spcBef>
+                <a:spcPts val="0"/>
+              </a:spcBef>
+              <a:spcAft>
+                <a:spcPts val="2684"/>
+              </a:spcAft>
+              <a:buFont typeface="Arial" panose="020B0604020202020204" pitchFamily="34" charset="0"/>
+              <a:buNone/>
+              <a:defRPr sz="5000" kern="1200">
+                <a:solidFill>
+                  <a:schemeClr val="tx1"/>
+                </a:solidFill>
+                <a:latin typeface="+mn-lt"/>
+                <a:ea typeface="+mn-ea"/>
+                <a:cs typeface="+mn-cs"/>
+              </a:defRPr>
+            </a:lvl2pPr>
+            <a:lvl3pPr marL="0" indent="0" algn="l" defTabSz="2138314" rtl="0" eaLnBrk="1" latinLnBrk="0" hangingPunct="1">
+              <a:lnSpc>
+                <a:spcPct val="90000"/>
+              </a:lnSpc>
+              <a:spcBef>
+                <a:spcPts val="0"/>
+              </a:spcBef>
+              <a:spcAft>
+                <a:spcPts val="3320"/>
+              </a:spcAft>
+              <a:buFont typeface="Arial" panose="020B0604020202020204" pitchFamily="34" charset="0"/>
+              <a:buNone/>
+              <a:defRPr sz="3200" kern="1200">
+                <a:solidFill>
+                  <a:schemeClr val="tx1"/>
+                </a:solidFill>
+                <a:latin typeface="+mn-lt"/>
+                <a:ea typeface="+mn-ea"/>
+                <a:cs typeface="+mn-cs"/>
+              </a:defRPr>
+            </a:lvl3pPr>
+            <a:lvl4pPr marL="0" indent="0" algn="l" defTabSz="2138314" rtl="0" eaLnBrk="1" latinLnBrk="0" hangingPunct="1">
+              <a:lnSpc>
+                <a:spcPct val="90000"/>
+              </a:lnSpc>
+              <a:spcBef>
+                <a:spcPts val="0"/>
+              </a:spcBef>
+              <a:buFont typeface="Arial" panose="020B0604020202020204" pitchFamily="34" charset="0"/>
+              <a:buNone/>
+              <a:defRPr sz="2684" b="1" kern="1200">
+                <a:solidFill>
+                  <a:schemeClr val="accent3"/>
+                </a:solidFill>
+                <a:latin typeface="+mn-lt"/>
+                <a:ea typeface="+mn-ea"/>
+                <a:cs typeface="+mn-cs"/>
+              </a:defRPr>
+            </a:lvl4pPr>
+            <a:lvl5pPr marL="0" indent="0" algn="l" defTabSz="2138314" rtl="0" eaLnBrk="1" latinLnBrk="0" hangingPunct="1">
+              <a:lnSpc>
+                <a:spcPct val="90000"/>
+              </a:lnSpc>
+              <a:spcBef>
+                <a:spcPts val="0"/>
+              </a:spcBef>
+              <a:buFont typeface="Arial" panose="020B0604020202020204" pitchFamily="34" charset="0"/>
+              <a:buNone/>
+              <a:defRPr sz="2100" b="1" kern="1200">
+                <a:solidFill>
+                  <a:schemeClr val="tx1"/>
+                </a:solidFill>
+                <a:latin typeface="+mn-lt"/>
+                <a:ea typeface="+mn-ea"/>
+                <a:cs typeface="+mn-cs"/>
+              </a:defRPr>
+            </a:lvl5pPr>
+            <a:lvl6pPr marL="0" indent="0" algn="l" defTabSz="2138314" rtl="0" eaLnBrk="1" latinLnBrk="0" hangingPunct="1">
+              <a:lnSpc>
+                <a:spcPct val="90000"/>
+              </a:lnSpc>
+              <a:spcBef>
+                <a:spcPts val="0"/>
+              </a:spcBef>
+              <a:buFont typeface="Arial" panose="020B0604020202020204" pitchFamily="34" charset="0"/>
+              <a:buNone/>
+              <a:defRPr sz="2100" kern="1200">
+                <a:solidFill>
+                  <a:schemeClr val="tx1"/>
+                </a:solidFill>
+                <a:latin typeface="+mn-lt"/>
+                <a:ea typeface="+mn-ea"/>
+                <a:cs typeface="+mn-cs"/>
+              </a:defRPr>
+            </a:lvl6pPr>
+            <a:lvl7pPr marL="0" indent="0" algn="l" defTabSz="2138314" rtl="0" eaLnBrk="1" latinLnBrk="0" hangingPunct="1">
+              <a:lnSpc>
+                <a:spcPct val="90000"/>
+              </a:lnSpc>
+              <a:spcBef>
+                <a:spcPts val="0"/>
+              </a:spcBef>
+              <a:spcAft>
+                <a:spcPts val="3673"/>
+              </a:spcAft>
+              <a:buFont typeface="Arial" panose="020B0604020202020204" pitchFamily="34" charset="0"/>
+              <a:buNone/>
+              <a:defRPr sz="1130" kern="1200" cap="all" baseline="0">
+                <a:solidFill>
+                  <a:schemeClr val="tx1"/>
+                </a:solidFill>
+                <a:latin typeface="+mn-lt"/>
+                <a:ea typeface="+mn-ea"/>
+                <a:cs typeface="+mn-cs"/>
+              </a:defRPr>
+            </a:lvl7pPr>
+            <a:lvl8pPr marL="177988" indent="-177988" algn="l" defTabSz="2138314" rtl="0" eaLnBrk="1" latinLnBrk="0" hangingPunct="1">
+              <a:lnSpc>
+                <a:spcPct val="90000"/>
+              </a:lnSpc>
+              <a:spcBef>
+                <a:spcPts val="0"/>
+              </a:spcBef>
+              <a:buClr>
+                <a:schemeClr val="accent3"/>
+              </a:buClr>
+              <a:buFont typeface="Arial" panose="020B0604020202020204" pitchFamily="34" charset="0"/>
+              <a:buChar char="•"/>
+              <a:defRPr sz="1695" kern="1200">
+                <a:solidFill>
+                  <a:schemeClr val="tx1"/>
+                </a:solidFill>
+                <a:latin typeface="+mn-lt"/>
+                <a:ea typeface="+mn-ea"/>
+                <a:cs typeface="+mn-cs"/>
+              </a:defRPr>
+            </a:lvl8pPr>
+            <a:lvl9pPr marL="355975" indent="-355975" algn="l" defTabSz="2138314" rtl="0" eaLnBrk="1" latinLnBrk="0" hangingPunct="1">
+              <a:lnSpc>
+                <a:spcPct val="90000"/>
+              </a:lnSpc>
+              <a:spcBef>
+                <a:spcPts val="0"/>
+              </a:spcBef>
+              <a:buClr>
+                <a:schemeClr val="accent3"/>
+              </a:buClr>
+              <a:buFont typeface="Arial" panose="020B0604020202020204" pitchFamily="34" charset="0"/>
+              <a:buChar char="•"/>
+              <a:defRPr sz="1695" kern="1200">
+                <a:solidFill>
+                  <a:schemeClr val="tx1"/>
+                </a:solidFill>
+                <a:latin typeface="+mn-lt"/>
+                <a:ea typeface="+mn-ea"/>
+                <a:cs typeface="+mn-cs"/>
+              </a:defRPr>
+            </a:lvl9pPr>
+          </a:lstStyle>
+          <a:p>
+            <a:r>
+              <a:rPr lang="en-GB" dirty="0"/>
+              <a:t>Figure 3: Comparison on accumulated returns (acc. return) on backtesting experiment on 22 liquid US stocks during 2021</a:t>
+            </a:r>
+          </a:p>
+        </p:txBody>
+      </p:sp>
       <p:grpSp>
         <p:nvGrpSpPr>
-          <p:cNvPr id="34" name="Group 33">
+          <p:cNvPr id="30" name="Group 29">
             <a:extLst>
               <a:ext uri="{FF2B5EF4-FFF2-40B4-BE49-F238E27FC236}">
-                <a16:creationId xmlns:a16="http://schemas.microsoft.com/office/drawing/2014/main" id="{29B25EBF-B3CC-699B-AC72-8F0D82AA1CE8}"/>
+                <a16:creationId xmlns:a16="http://schemas.microsoft.com/office/drawing/2014/main" id="{AD956C7D-D000-E562-DB54-69620F4C3FCC}"/>
               </a:ext>
             </a:extLst>
           </p:cNvPr>
@@ -6935,18 +8018,336 @@
         </p:nvGrpSpPr>
         <p:grpSpPr>
           <a:xfrm>
-            <a:off x="409941" y="21704361"/>
-            <a:ext cx="7458403" cy="2111323"/>
-            <a:chOff x="620807" y="19901782"/>
-            <a:chExt cx="7458403" cy="2111323"/>
+            <a:off x="-13795710" y="11783024"/>
+            <a:ext cx="11278249" cy="4542069"/>
+            <a:chOff x="9555775" y="18336704"/>
+            <a:chExt cx="11278249" cy="4542069"/>
           </a:xfrm>
         </p:grpSpPr>
+        <p:grpSp>
+          <p:nvGrpSpPr>
+            <p:cNvPr id="36" name="Group 35">
+              <a:extLst>
+                <a:ext uri="{FF2B5EF4-FFF2-40B4-BE49-F238E27FC236}">
+                  <a16:creationId xmlns:a16="http://schemas.microsoft.com/office/drawing/2014/main" id="{EB311453-0D9C-4BB5-310E-B6A129280B48}"/>
+                </a:ext>
+              </a:extLst>
+            </p:cNvPr>
+            <p:cNvGrpSpPr/>
+            <p:nvPr/>
+          </p:nvGrpSpPr>
+          <p:grpSpPr>
+            <a:xfrm>
+              <a:off x="9555775" y="18336704"/>
+              <a:ext cx="11278249" cy="4542069"/>
+              <a:chOff x="9555775" y="18028184"/>
+              <a:chExt cx="11278249" cy="4542069"/>
+            </a:xfrm>
+          </p:grpSpPr>
+          <p:sp>
+            <p:nvSpPr>
+              <p:cNvPr id="40" name="Text Placeholder 8">
+                <a:extLst>
+                  <a:ext uri="{FF2B5EF4-FFF2-40B4-BE49-F238E27FC236}">
+                    <a16:creationId xmlns:a16="http://schemas.microsoft.com/office/drawing/2014/main" id="{E065404D-DC46-7A9F-22CD-27AC3B73F5F7}"/>
+                  </a:ext>
+                </a:extLst>
+              </p:cNvPr>
+              <p:cNvSpPr txBox="1">
+                <a:spLocks/>
+              </p:cNvSpPr>
+              <p:nvPr/>
+            </p:nvSpPr>
+            <p:spPr>
+              <a:xfrm>
+                <a:off x="9624014" y="21972520"/>
+                <a:ext cx="11091865" cy="597733"/>
+              </a:xfrm>
+              <a:prstGeom prst="rect">
+                <a:avLst/>
+              </a:prstGeom>
+            </p:spPr>
+            <p:txBody>
+              <a:bodyPr vert="horz" lIns="0" tIns="0" rIns="0" bIns="0" rtlCol="0">
+                <a:noAutofit/>
+              </a:bodyPr>
+              <a:lstStyle>
+                <a:lvl1pPr marL="0" indent="0" algn="l" defTabSz="2138314" rtl="0" eaLnBrk="1" latinLnBrk="0" hangingPunct="1">
+                  <a:lnSpc>
+                    <a:spcPct val="90000"/>
+                  </a:lnSpc>
+                  <a:spcBef>
+                    <a:spcPts val="0"/>
+                  </a:spcBef>
+                  <a:spcAft>
+                    <a:spcPts val="0"/>
+                  </a:spcAft>
+                  <a:buFont typeface="Arial" panose="020B0604020202020204" pitchFamily="34" charset="0"/>
+                  <a:buNone/>
+                  <a:defRPr sz="1200" i="1" kern="1200">
+                    <a:solidFill>
+                      <a:schemeClr val="tx1"/>
+                    </a:solidFill>
+                    <a:latin typeface="+mn-lt"/>
+                    <a:ea typeface="+mn-ea"/>
+                    <a:cs typeface="+mn-cs"/>
+                  </a:defRPr>
+                </a:lvl1pPr>
+                <a:lvl2pPr marL="0" indent="0" algn="l" defTabSz="2138314" rtl="0" eaLnBrk="1" latinLnBrk="0" hangingPunct="1">
+                  <a:lnSpc>
+                    <a:spcPct val="83000"/>
+                  </a:lnSpc>
+                  <a:spcBef>
+                    <a:spcPts val="0"/>
+                  </a:spcBef>
+                  <a:spcAft>
+                    <a:spcPts val="2684"/>
+                  </a:spcAft>
+                  <a:buFont typeface="Arial" panose="020B0604020202020204" pitchFamily="34" charset="0"/>
+                  <a:buNone/>
+                  <a:defRPr sz="5000" kern="1200">
+                    <a:solidFill>
+                      <a:schemeClr val="tx1"/>
+                    </a:solidFill>
+                    <a:latin typeface="+mn-lt"/>
+                    <a:ea typeface="+mn-ea"/>
+                    <a:cs typeface="+mn-cs"/>
+                  </a:defRPr>
+                </a:lvl2pPr>
+                <a:lvl3pPr marL="0" indent="0" algn="l" defTabSz="2138314" rtl="0" eaLnBrk="1" latinLnBrk="0" hangingPunct="1">
+                  <a:lnSpc>
+                    <a:spcPct val="90000"/>
+                  </a:lnSpc>
+                  <a:spcBef>
+                    <a:spcPts val="0"/>
+                  </a:spcBef>
+                  <a:spcAft>
+                    <a:spcPts val="3320"/>
+                  </a:spcAft>
+                  <a:buFont typeface="Arial" panose="020B0604020202020204" pitchFamily="34" charset="0"/>
+                  <a:buNone/>
+                  <a:defRPr sz="3200" kern="1200">
+                    <a:solidFill>
+                      <a:schemeClr val="tx1"/>
+                    </a:solidFill>
+                    <a:latin typeface="+mn-lt"/>
+                    <a:ea typeface="+mn-ea"/>
+                    <a:cs typeface="+mn-cs"/>
+                  </a:defRPr>
+                </a:lvl3pPr>
+                <a:lvl4pPr marL="0" indent="0" algn="l" defTabSz="2138314" rtl="0" eaLnBrk="1" latinLnBrk="0" hangingPunct="1">
+                  <a:lnSpc>
+                    <a:spcPct val="90000"/>
+                  </a:lnSpc>
+                  <a:spcBef>
+                    <a:spcPts val="0"/>
+                  </a:spcBef>
+                  <a:buFont typeface="Arial" panose="020B0604020202020204" pitchFamily="34" charset="0"/>
+                  <a:buNone/>
+                  <a:defRPr sz="2684" b="1" kern="1200">
+                    <a:solidFill>
+                      <a:schemeClr val="accent3"/>
+                    </a:solidFill>
+                    <a:latin typeface="+mn-lt"/>
+                    <a:ea typeface="+mn-ea"/>
+                    <a:cs typeface="+mn-cs"/>
+                  </a:defRPr>
+                </a:lvl4pPr>
+                <a:lvl5pPr marL="0" indent="0" algn="l" defTabSz="2138314" rtl="0" eaLnBrk="1" latinLnBrk="0" hangingPunct="1">
+                  <a:lnSpc>
+                    <a:spcPct val="90000"/>
+                  </a:lnSpc>
+                  <a:spcBef>
+                    <a:spcPts val="0"/>
+                  </a:spcBef>
+                  <a:buFont typeface="Arial" panose="020B0604020202020204" pitchFamily="34" charset="0"/>
+                  <a:buNone/>
+                  <a:defRPr sz="2100" b="1" kern="1200">
+                    <a:solidFill>
+                      <a:schemeClr val="tx1"/>
+                    </a:solidFill>
+                    <a:latin typeface="+mn-lt"/>
+                    <a:ea typeface="+mn-ea"/>
+                    <a:cs typeface="+mn-cs"/>
+                  </a:defRPr>
+                </a:lvl5pPr>
+                <a:lvl6pPr marL="0" indent="0" algn="l" defTabSz="2138314" rtl="0" eaLnBrk="1" latinLnBrk="0" hangingPunct="1">
+                  <a:lnSpc>
+                    <a:spcPct val="90000"/>
+                  </a:lnSpc>
+                  <a:spcBef>
+                    <a:spcPts val="0"/>
+                  </a:spcBef>
+                  <a:buFont typeface="Arial" panose="020B0604020202020204" pitchFamily="34" charset="0"/>
+                  <a:buNone/>
+                  <a:defRPr sz="2100" kern="1200">
+                    <a:solidFill>
+                      <a:schemeClr val="tx1"/>
+                    </a:solidFill>
+                    <a:latin typeface="+mn-lt"/>
+                    <a:ea typeface="+mn-ea"/>
+                    <a:cs typeface="+mn-cs"/>
+                  </a:defRPr>
+                </a:lvl6pPr>
+                <a:lvl7pPr marL="0" indent="0" algn="l" defTabSz="2138314" rtl="0" eaLnBrk="1" latinLnBrk="0" hangingPunct="1">
+                  <a:lnSpc>
+                    <a:spcPct val="90000"/>
+                  </a:lnSpc>
+                  <a:spcBef>
+                    <a:spcPts val="0"/>
+                  </a:spcBef>
+                  <a:spcAft>
+                    <a:spcPts val="3673"/>
+                  </a:spcAft>
+                  <a:buFont typeface="Arial" panose="020B0604020202020204" pitchFamily="34" charset="0"/>
+                  <a:buNone/>
+                  <a:defRPr sz="1130" kern="1200" cap="all" baseline="0">
+                    <a:solidFill>
+                      <a:schemeClr val="tx1"/>
+                    </a:solidFill>
+                    <a:latin typeface="+mn-lt"/>
+                    <a:ea typeface="+mn-ea"/>
+                    <a:cs typeface="+mn-cs"/>
+                  </a:defRPr>
+                </a:lvl7pPr>
+                <a:lvl8pPr marL="177988" indent="-177988" algn="l" defTabSz="2138314" rtl="0" eaLnBrk="1" latinLnBrk="0" hangingPunct="1">
+                  <a:lnSpc>
+                    <a:spcPct val="90000"/>
+                  </a:lnSpc>
+                  <a:spcBef>
+                    <a:spcPts val="0"/>
+                  </a:spcBef>
+                  <a:buClr>
+                    <a:schemeClr val="accent3"/>
+                  </a:buClr>
+                  <a:buFont typeface="Arial" panose="020B0604020202020204" pitchFamily="34" charset="0"/>
+                  <a:buChar char="•"/>
+                  <a:defRPr sz="1695" kern="1200">
+                    <a:solidFill>
+                      <a:schemeClr val="tx1"/>
+                    </a:solidFill>
+                    <a:latin typeface="+mn-lt"/>
+                    <a:ea typeface="+mn-ea"/>
+                    <a:cs typeface="+mn-cs"/>
+                  </a:defRPr>
+                </a:lvl8pPr>
+                <a:lvl9pPr marL="355975" indent="-355975" algn="l" defTabSz="2138314" rtl="0" eaLnBrk="1" latinLnBrk="0" hangingPunct="1">
+                  <a:lnSpc>
+                    <a:spcPct val="90000"/>
+                  </a:lnSpc>
+                  <a:spcBef>
+                    <a:spcPts val="0"/>
+                  </a:spcBef>
+                  <a:buClr>
+                    <a:schemeClr val="accent3"/>
+                  </a:buClr>
+                  <a:buFont typeface="Arial" panose="020B0604020202020204" pitchFamily="34" charset="0"/>
+                  <a:buChar char="•"/>
+                  <a:defRPr sz="1695" kern="1200">
+                    <a:solidFill>
+                      <a:schemeClr val="tx1"/>
+                    </a:solidFill>
+                    <a:latin typeface="+mn-lt"/>
+                    <a:ea typeface="+mn-ea"/>
+                    <a:cs typeface="+mn-cs"/>
+                  </a:defRPr>
+                </a:lvl9pPr>
+              </a:lstStyle>
+              <a:p>
+                <a:pPr algn="ctr"/>
+                <a:r>
+                  <a:rPr lang="en-GB" dirty="0"/>
+                  <a:t>Figure 4: Comparison of Mean Relative Absolute Error (</a:t>
+                </a:r>
+                <a:r>
+                  <a:rPr lang="en-GB" dirty="0" err="1"/>
+                  <a:t>MRAEf</a:t>
+                </a:r>
+                <a:r>
+                  <a:rPr lang="en-GB" dirty="0"/>
+                  <a:t>) of different forecasting methods predicting the returns of 22 US stocks through 2020 per forecast distance.</a:t>
+                </a:r>
+              </a:p>
+            </p:txBody>
+          </p:sp>
+          <p:pic>
+            <p:nvPicPr>
+              <p:cNvPr id="49" name="Picture 48">
+                <a:extLst>
+                  <a:ext uri="{FF2B5EF4-FFF2-40B4-BE49-F238E27FC236}">
+                    <a16:creationId xmlns:a16="http://schemas.microsoft.com/office/drawing/2014/main" id="{8FD43165-50DC-B0FF-B1B9-BBDF3D644407}"/>
+                  </a:ext>
+                </a:extLst>
+              </p:cNvPr>
+              <p:cNvPicPr>
+                <a:picLocks noChangeAspect="1"/>
+              </p:cNvPicPr>
+              <p:nvPr/>
+            </p:nvPicPr>
+            <p:blipFill>
+              <a:blip r:embed="rId6"/>
+              <a:stretch>
+                <a:fillRect/>
+              </a:stretch>
+            </p:blipFill>
+            <p:spPr>
+              <a:xfrm>
+                <a:off x="9555775" y="18028184"/>
+                <a:ext cx="5486612" cy="3777045"/>
+              </a:xfrm>
+              <a:prstGeom prst="rect">
+                <a:avLst/>
+              </a:prstGeom>
+            </p:spPr>
+          </p:pic>
+          <p:pic>
+            <p:nvPicPr>
+              <p:cNvPr id="50" name="Picture 49">
+                <a:extLst>
+                  <a:ext uri="{FF2B5EF4-FFF2-40B4-BE49-F238E27FC236}">
+                    <a16:creationId xmlns:a16="http://schemas.microsoft.com/office/drawing/2014/main" id="{C7BE37E5-2441-091B-18CD-594E5785EFEE}"/>
+                  </a:ext>
+                </a:extLst>
+              </p:cNvPr>
+              <p:cNvPicPr>
+                <a:picLocks noChangeAspect="1"/>
+              </p:cNvPicPr>
+              <p:nvPr/>
+            </p:nvPicPr>
+            <p:blipFill>
+              <a:blip r:embed="rId7">
+                <a:clrChange>
+                  <a:clrFrom>
+                    <a:srgbClr val="FFFFFF"/>
+                  </a:clrFrom>
+                  <a:clrTo>
+                    <a:srgbClr val="FFFFFF">
+                      <a:alpha val="0"/>
+                    </a:srgbClr>
+                  </a:clrTo>
+                </a:clrChange>
+              </a:blip>
+              <a:stretch>
+                <a:fillRect/>
+              </a:stretch>
+            </p:blipFill>
+            <p:spPr>
+              <a:xfrm>
+                <a:off x="15149100" y="18150965"/>
+                <a:ext cx="5684924" cy="3531485"/>
+              </a:xfrm>
+              <a:prstGeom prst="rect">
+                <a:avLst/>
+              </a:prstGeom>
+            </p:spPr>
+          </p:pic>
+        </p:grpSp>
         <p:sp>
           <p:nvSpPr>
-            <p:cNvPr id="33" name="Rectangle 32">
+            <p:cNvPr id="37" name="Left Brace 36">
               <a:extLst>
                 <a:ext uri="{FF2B5EF4-FFF2-40B4-BE49-F238E27FC236}">
-                  <a16:creationId xmlns:a16="http://schemas.microsoft.com/office/drawing/2014/main" id="{2475048E-BF44-09BC-01B5-2930C12A0103}"/>
+                  <a16:creationId xmlns:a16="http://schemas.microsoft.com/office/drawing/2014/main" id="{29BEDAF5-CF84-C0A6-549B-C9605D599FFC}"/>
                 </a:ext>
               </a:extLst>
             </p:cNvPr>
@@ -6955,53 +8356,333 @@
           </p:nvSpPr>
           <p:spPr>
             <a:xfrm>
-              <a:off x="620807" y="19901782"/>
-              <a:ext cx="7458403" cy="2111323"/>
+              <a:off x="14926199" y="18392745"/>
+              <a:ext cx="339090" cy="3127055"/>
             </a:xfrm>
-            <a:prstGeom prst="rect">
-              <a:avLst/>
+            <a:prstGeom prst="leftBrace">
+              <a:avLst>
+                <a:gd name="adj1" fmla="val 27080"/>
+                <a:gd name="adj2" fmla="val 94777"/>
+              </a:avLst>
             </a:prstGeom>
-            <a:noFill/>
-            <a:ln>
-              <a:noFill/>
+            <a:ln w="12700">
+              <a:solidFill>
+                <a:schemeClr val="accent3"/>
+              </a:solidFill>
             </a:ln>
           </p:spPr>
           <p:style>
-            <a:lnRef idx="2">
-              <a:schemeClr val="accent1">
-                <a:shade val="50000"/>
-              </a:schemeClr>
+            <a:lnRef idx="1">
+              <a:schemeClr val="accent1"/>
             </a:lnRef>
-            <a:fillRef idx="1">
+            <a:fillRef idx="0">
               <a:schemeClr val="accent1"/>
             </a:fillRef>
             <a:effectRef idx="0">
               <a:schemeClr val="accent1"/>
             </a:effectRef>
             <a:fontRef idx="minor">
-              <a:schemeClr val="lt1"/>
+              <a:schemeClr val="tx1"/>
             </a:fontRef>
           </p:style>
           <p:txBody>
-            <a:bodyPr rot="0" spcFirstLastPara="0" vertOverflow="overflow" horzOverflow="overflow" vert="horz" wrap="square" lIns="91440" tIns="45720" rIns="91440" bIns="45720" numCol="1" spcCol="0" rtlCol="0" fromWordArt="0" anchor="ctr" anchorCtr="0" forceAA="0" compatLnSpc="1">
-              <a:prstTxWarp prst="textNoShape">
-                <a:avLst/>
-              </a:prstTxWarp>
-              <a:noAutofit/>
-            </a:bodyPr>
+            <a:bodyPr rtlCol="0" anchor="ctr"/>
             <a:lstStyle/>
             <a:p>
               <a:pPr algn="ctr"/>
-              <a:endParaRPr lang="en-GB" dirty="0"/>
+              <a:endParaRPr lang="en-GB"/>
             </a:p>
           </p:txBody>
         </p:sp>
+        <p:cxnSp>
+          <p:nvCxnSpPr>
+            <p:cNvPr id="38" name="Connector: Curved 37">
+              <a:extLst>
+                <a:ext uri="{FF2B5EF4-FFF2-40B4-BE49-F238E27FC236}">
+                  <a16:creationId xmlns:a16="http://schemas.microsoft.com/office/drawing/2014/main" id="{89D2DE62-9C3F-3038-E9E3-8140679B72EF}"/>
+                </a:ext>
+              </a:extLst>
+            </p:cNvPr>
+            <p:cNvCxnSpPr>
+              <a:cxnSpLocks/>
+              <a:endCxn id="37" idx="1"/>
+            </p:cNvCxnSpPr>
+            <p:nvPr/>
+          </p:nvCxnSpPr>
+          <p:spPr>
+            <a:xfrm flipV="1">
+              <a:off x="14747240" y="21356474"/>
+              <a:ext cx="178959" cy="91286"/>
+            </a:xfrm>
+            <a:prstGeom prst="curvedConnector3">
+              <a:avLst/>
+            </a:prstGeom>
+            <a:ln w="19050">
+              <a:solidFill>
+                <a:schemeClr val="accent3"/>
+              </a:solidFill>
+              <a:tailEnd type="triangle"/>
+            </a:ln>
+          </p:spPr>
+          <p:style>
+            <a:lnRef idx="1">
+              <a:schemeClr val="accent1"/>
+            </a:lnRef>
+            <a:fillRef idx="0">
+              <a:schemeClr val="accent1"/>
+            </a:fillRef>
+            <a:effectRef idx="0">
+              <a:schemeClr val="accent1"/>
+            </a:effectRef>
+            <a:fontRef idx="minor">
+              <a:schemeClr val="tx1"/>
+            </a:fontRef>
+          </p:style>
+        </p:cxnSp>
+      </p:grpSp>
+      <p:sp>
+        <p:nvSpPr>
+          <p:cNvPr id="75" name="Text Placeholder 8">
+            <a:extLst>
+              <a:ext uri="{FF2B5EF4-FFF2-40B4-BE49-F238E27FC236}">
+                <a16:creationId xmlns:a16="http://schemas.microsoft.com/office/drawing/2014/main" id="{025F3AEB-91E9-BE32-3C11-0AB20AD2516E}"/>
+              </a:ext>
+            </a:extLst>
+          </p:cNvPr>
+          <p:cNvSpPr txBox="1">
+            <a:spLocks/>
+          </p:cNvSpPr>
+          <p:nvPr/>
+        </p:nvSpPr>
+        <p:spPr>
+          <a:xfrm>
+            <a:off x="14769439" y="27228594"/>
+            <a:ext cx="6165724" cy="597733"/>
+          </a:xfrm>
+          <a:prstGeom prst="rect">
+            <a:avLst/>
+          </a:prstGeom>
+        </p:spPr>
+        <p:txBody>
+          <a:bodyPr vert="horz" lIns="0" tIns="0" rIns="0" bIns="0" rtlCol="0">
+            <a:noAutofit/>
+          </a:bodyPr>
+          <a:lstStyle>
+            <a:lvl1pPr marL="0" indent="0" algn="l" defTabSz="2138314" rtl="0" eaLnBrk="1" latinLnBrk="0" hangingPunct="1">
+              <a:lnSpc>
+                <a:spcPct val="90000"/>
+              </a:lnSpc>
+              <a:spcBef>
+                <a:spcPts val="0"/>
+              </a:spcBef>
+              <a:spcAft>
+                <a:spcPts val="0"/>
+              </a:spcAft>
+              <a:buFont typeface="Arial" panose="020B0604020202020204" pitchFamily="34" charset="0"/>
+              <a:buNone/>
+              <a:defRPr sz="1200" i="1" kern="1200">
+                <a:solidFill>
+                  <a:schemeClr val="tx1"/>
+                </a:solidFill>
+                <a:latin typeface="+mn-lt"/>
+                <a:ea typeface="+mn-ea"/>
+                <a:cs typeface="+mn-cs"/>
+              </a:defRPr>
+            </a:lvl1pPr>
+            <a:lvl2pPr marL="0" indent="0" algn="l" defTabSz="2138314" rtl="0" eaLnBrk="1" latinLnBrk="0" hangingPunct="1">
+              <a:lnSpc>
+                <a:spcPct val="83000"/>
+              </a:lnSpc>
+              <a:spcBef>
+                <a:spcPts val="0"/>
+              </a:spcBef>
+              <a:spcAft>
+                <a:spcPts val="2684"/>
+              </a:spcAft>
+              <a:buFont typeface="Arial" panose="020B0604020202020204" pitchFamily="34" charset="0"/>
+              <a:buNone/>
+              <a:defRPr sz="5000" kern="1200">
+                <a:solidFill>
+                  <a:schemeClr val="tx1"/>
+                </a:solidFill>
+                <a:latin typeface="+mn-lt"/>
+                <a:ea typeface="+mn-ea"/>
+                <a:cs typeface="+mn-cs"/>
+              </a:defRPr>
+            </a:lvl2pPr>
+            <a:lvl3pPr marL="0" indent="0" algn="l" defTabSz="2138314" rtl="0" eaLnBrk="1" latinLnBrk="0" hangingPunct="1">
+              <a:lnSpc>
+                <a:spcPct val="90000"/>
+              </a:lnSpc>
+              <a:spcBef>
+                <a:spcPts val="0"/>
+              </a:spcBef>
+              <a:spcAft>
+                <a:spcPts val="3320"/>
+              </a:spcAft>
+              <a:buFont typeface="Arial" panose="020B0604020202020204" pitchFamily="34" charset="0"/>
+              <a:buNone/>
+              <a:defRPr sz="3200" kern="1200">
+                <a:solidFill>
+                  <a:schemeClr val="tx1"/>
+                </a:solidFill>
+                <a:latin typeface="+mn-lt"/>
+                <a:ea typeface="+mn-ea"/>
+                <a:cs typeface="+mn-cs"/>
+              </a:defRPr>
+            </a:lvl3pPr>
+            <a:lvl4pPr marL="0" indent="0" algn="l" defTabSz="2138314" rtl="0" eaLnBrk="1" latinLnBrk="0" hangingPunct="1">
+              <a:lnSpc>
+                <a:spcPct val="90000"/>
+              </a:lnSpc>
+              <a:spcBef>
+                <a:spcPts val="0"/>
+              </a:spcBef>
+              <a:buFont typeface="Arial" panose="020B0604020202020204" pitchFamily="34" charset="0"/>
+              <a:buNone/>
+              <a:defRPr sz="2684" b="1" kern="1200">
+                <a:solidFill>
+                  <a:schemeClr val="accent3"/>
+                </a:solidFill>
+                <a:latin typeface="+mn-lt"/>
+                <a:ea typeface="+mn-ea"/>
+                <a:cs typeface="+mn-cs"/>
+              </a:defRPr>
+            </a:lvl4pPr>
+            <a:lvl5pPr marL="0" indent="0" algn="l" defTabSz="2138314" rtl="0" eaLnBrk="1" latinLnBrk="0" hangingPunct="1">
+              <a:lnSpc>
+                <a:spcPct val="90000"/>
+              </a:lnSpc>
+              <a:spcBef>
+                <a:spcPts val="0"/>
+              </a:spcBef>
+              <a:buFont typeface="Arial" panose="020B0604020202020204" pitchFamily="34" charset="0"/>
+              <a:buNone/>
+              <a:defRPr sz="2100" b="1" kern="1200">
+                <a:solidFill>
+                  <a:schemeClr val="tx1"/>
+                </a:solidFill>
+                <a:latin typeface="+mn-lt"/>
+                <a:ea typeface="+mn-ea"/>
+                <a:cs typeface="+mn-cs"/>
+              </a:defRPr>
+            </a:lvl5pPr>
+            <a:lvl6pPr marL="0" indent="0" algn="l" defTabSz="2138314" rtl="0" eaLnBrk="1" latinLnBrk="0" hangingPunct="1">
+              <a:lnSpc>
+                <a:spcPct val="90000"/>
+              </a:lnSpc>
+              <a:spcBef>
+                <a:spcPts val="0"/>
+              </a:spcBef>
+              <a:buFont typeface="Arial" panose="020B0604020202020204" pitchFamily="34" charset="0"/>
+              <a:buNone/>
+              <a:defRPr sz="2100" kern="1200">
+                <a:solidFill>
+                  <a:schemeClr val="tx1"/>
+                </a:solidFill>
+                <a:latin typeface="+mn-lt"/>
+                <a:ea typeface="+mn-ea"/>
+                <a:cs typeface="+mn-cs"/>
+              </a:defRPr>
+            </a:lvl6pPr>
+            <a:lvl7pPr marL="0" indent="0" algn="l" defTabSz="2138314" rtl="0" eaLnBrk="1" latinLnBrk="0" hangingPunct="1">
+              <a:lnSpc>
+                <a:spcPct val="90000"/>
+              </a:lnSpc>
+              <a:spcBef>
+                <a:spcPts val="0"/>
+              </a:spcBef>
+              <a:spcAft>
+                <a:spcPts val="3673"/>
+              </a:spcAft>
+              <a:buFont typeface="Arial" panose="020B0604020202020204" pitchFamily="34" charset="0"/>
+              <a:buNone/>
+              <a:defRPr sz="1130" kern="1200" cap="all" baseline="0">
+                <a:solidFill>
+                  <a:schemeClr val="tx1"/>
+                </a:solidFill>
+                <a:latin typeface="+mn-lt"/>
+                <a:ea typeface="+mn-ea"/>
+                <a:cs typeface="+mn-cs"/>
+              </a:defRPr>
+            </a:lvl7pPr>
+            <a:lvl8pPr marL="177988" indent="-177988" algn="l" defTabSz="2138314" rtl="0" eaLnBrk="1" latinLnBrk="0" hangingPunct="1">
+              <a:lnSpc>
+                <a:spcPct val="90000"/>
+              </a:lnSpc>
+              <a:spcBef>
+                <a:spcPts val="0"/>
+              </a:spcBef>
+              <a:buClr>
+                <a:schemeClr val="accent3"/>
+              </a:buClr>
+              <a:buFont typeface="Arial" panose="020B0604020202020204" pitchFamily="34" charset="0"/>
+              <a:buChar char="•"/>
+              <a:defRPr sz="1695" kern="1200">
+                <a:solidFill>
+                  <a:schemeClr val="tx1"/>
+                </a:solidFill>
+                <a:latin typeface="+mn-lt"/>
+                <a:ea typeface="+mn-ea"/>
+                <a:cs typeface="+mn-cs"/>
+              </a:defRPr>
+            </a:lvl8pPr>
+            <a:lvl9pPr marL="355975" indent="-355975" algn="l" defTabSz="2138314" rtl="0" eaLnBrk="1" latinLnBrk="0" hangingPunct="1">
+              <a:lnSpc>
+                <a:spcPct val="90000"/>
+              </a:lnSpc>
+              <a:spcBef>
+                <a:spcPts val="0"/>
+              </a:spcBef>
+              <a:buClr>
+                <a:schemeClr val="accent3"/>
+              </a:buClr>
+              <a:buFont typeface="Arial" panose="020B0604020202020204" pitchFamily="34" charset="0"/>
+              <a:buChar char="•"/>
+              <a:defRPr sz="1695" kern="1200">
+                <a:solidFill>
+                  <a:schemeClr val="tx1"/>
+                </a:solidFill>
+                <a:latin typeface="+mn-lt"/>
+                <a:ea typeface="+mn-ea"/>
+                <a:cs typeface="+mn-cs"/>
+              </a:defRPr>
+            </a:lvl9pPr>
+          </a:lstStyle>
+          <a:p>
+            <a:r>
+              <a:rPr lang="en-GB" dirty="0"/>
+              <a:t>Figure 5:  Code and results for self-contained MV-MPC example using AirBorne in Julia, trading in Google and Apple through 2017 with a 2% transaction fee and perfect information forecast. </a:t>
+            </a:r>
+          </a:p>
+        </p:txBody>
+      </p:sp>
+      <p:grpSp>
+        <p:nvGrpSpPr>
+          <p:cNvPr id="86" name="Group 85">
+            <a:extLst>
+              <a:ext uri="{FF2B5EF4-FFF2-40B4-BE49-F238E27FC236}">
+                <a16:creationId xmlns:a16="http://schemas.microsoft.com/office/drawing/2014/main" id="{32D46B47-19C5-4049-5033-4F71D6F1D6FB}"/>
+              </a:ext>
+            </a:extLst>
+          </p:cNvPr>
+          <p:cNvGrpSpPr/>
+          <p:nvPr/>
+        </p:nvGrpSpPr>
+        <p:grpSpPr>
+          <a:xfrm>
+            <a:off x="14747536" y="16250435"/>
+            <a:ext cx="6271981" cy="10835442"/>
+            <a:chOff x="14747536" y="16250435"/>
+            <a:chExt cx="6271981" cy="10835442"/>
+          </a:xfrm>
+        </p:grpSpPr>
         <p:pic>
           <p:nvPicPr>
-            <p:cNvPr id="24" name="Picture 23">
+            <p:cNvPr id="80" name="Picture 79">
               <a:extLst>
                 <a:ext uri="{FF2B5EF4-FFF2-40B4-BE49-F238E27FC236}">
-                  <a16:creationId xmlns:a16="http://schemas.microsoft.com/office/drawing/2014/main" id="{A5B5A3B3-A848-15EA-BD16-E03F737A302C}"/>
+                  <a16:creationId xmlns:a16="http://schemas.microsoft.com/office/drawing/2014/main" id="{D8DFF931-2036-0CCE-61A6-AF04B5EE616B}"/>
                 </a:ext>
               </a:extLst>
             </p:cNvPr>
@@ -7011,13 +8692,13 @@
             <p:nvPr/>
           </p:nvPicPr>
           <p:blipFill>
-            <a:blip r:embed="rId10">
+            <a:blip r:embed="rId18">
               <a:clrChange>
                 <a:clrFrom>
-                  <a:srgbClr val="FFFFFF"/>
+                  <a:srgbClr val="F5F5F5"/>
                 </a:clrFrom>
                 <a:clrTo>
-                  <a:srgbClr val="FFFFFF">
+                  <a:srgbClr val="F5F5F5">
                     <a:alpha val="0"/>
                   </a:srgbClr>
                 </a:clrTo>
@@ -7029,8 +8710,8 @@
           </p:blipFill>
           <p:spPr>
             <a:xfrm>
-              <a:off x="649785" y="20003099"/>
-              <a:ext cx="7381816" cy="861493"/>
+              <a:off x="14755507" y="16250435"/>
+              <a:ext cx="6264010" cy="6777777"/>
             </a:xfrm>
             <a:prstGeom prst="rect">
               <a:avLst/>
@@ -7039,10 +8720,10 @@
         </p:pic>
         <p:pic>
           <p:nvPicPr>
-            <p:cNvPr id="26" name="Picture 25">
+            <p:cNvPr id="84" name="Picture 83">
               <a:extLst>
                 <a:ext uri="{FF2B5EF4-FFF2-40B4-BE49-F238E27FC236}">
-                  <a16:creationId xmlns:a16="http://schemas.microsoft.com/office/drawing/2014/main" id="{97A214E6-646F-3E83-D1C7-E099A5066A09}"/>
+                  <a16:creationId xmlns:a16="http://schemas.microsoft.com/office/drawing/2014/main" id="{D85549DA-BB50-1743-918E-EB2F3A97BD67}"/>
                 </a:ext>
               </a:extLst>
             </p:cNvPr>
@@ -7052,760 +8733,22 @@
             <p:nvPr/>
           </p:nvPicPr>
           <p:blipFill>
-            <a:blip r:embed="rId11">
-              <a:clrChange>
-                <a:clrFrom>
-                  <a:srgbClr val="FFFFFF"/>
-                </a:clrFrom>
-                <a:clrTo>
-                  <a:srgbClr val="FFFFFF">
-                    <a:alpha val="0"/>
-                  </a:srgbClr>
-                </a:clrTo>
-              </a:clrChange>
-            </a:blip>
+            <a:blip r:embed="rId19"/>
             <a:stretch>
               <a:fillRect/>
             </a:stretch>
           </p:blipFill>
           <p:spPr>
             <a:xfrm>
-              <a:off x="1322735" y="20843948"/>
-              <a:ext cx="3916204" cy="569549"/>
+              <a:off x="14747536" y="23437112"/>
+              <a:ext cx="5824735" cy="3648765"/>
             </a:xfrm>
             <a:prstGeom prst="rect">
               <a:avLst/>
             </a:prstGeom>
           </p:spPr>
         </p:pic>
-        <p:pic>
-          <p:nvPicPr>
-            <p:cNvPr id="28" name="Picture 27">
-              <a:extLst>
-                <a:ext uri="{FF2B5EF4-FFF2-40B4-BE49-F238E27FC236}">
-                  <a16:creationId xmlns:a16="http://schemas.microsoft.com/office/drawing/2014/main" id="{4088B72F-7EEB-6771-A39F-AA73D6A2649E}"/>
-                </a:ext>
-              </a:extLst>
-            </p:cNvPr>
-            <p:cNvPicPr>
-              <a:picLocks noChangeAspect="1"/>
-            </p:cNvPicPr>
-            <p:nvPr/>
-          </p:nvPicPr>
-          <p:blipFill>
-            <a:blip r:embed="rId12">
-              <a:clrChange>
-                <a:clrFrom>
-                  <a:srgbClr val="FFFFFF"/>
-                </a:clrFrom>
-                <a:clrTo>
-                  <a:srgbClr val="FFFFFF">
-                    <a:alpha val="0"/>
-                  </a:srgbClr>
-                </a:clrTo>
-              </a:clrChange>
-            </a:blip>
-            <a:stretch>
-              <a:fillRect/>
-            </a:stretch>
-          </p:blipFill>
-          <p:spPr>
-            <a:xfrm>
-              <a:off x="1514028" y="21452840"/>
-              <a:ext cx="3588720" cy="491365"/>
-            </a:xfrm>
-            <a:prstGeom prst="rect">
-              <a:avLst/>
-            </a:prstGeom>
-          </p:spPr>
-        </p:pic>
-        <p:sp>
-          <p:nvSpPr>
-            <p:cNvPr id="31" name="TextBox 30">
-              <a:extLst>
-                <a:ext uri="{FF2B5EF4-FFF2-40B4-BE49-F238E27FC236}">
-                  <a16:creationId xmlns:a16="http://schemas.microsoft.com/office/drawing/2014/main" id="{E166E783-E372-4B6D-2C61-D7114711BC3D}"/>
-                </a:ext>
-              </a:extLst>
-            </p:cNvPr>
-            <p:cNvSpPr txBox="1"/>
-            <p:nvPr/>
-          </p:nvSpPr>
-          <p:spPr>
-            <a:xfrm>
-              <a:off x="1034935" y="21075053"/>
-              <a:ext cx="362173" cy="307776"/>
-            </a:xfrm>
-            <a:prstGeom prst="rect">
-              <a:avLst/>
-            </a:prstGeom>
-            <a:noFill/>
-          </p:spPr>
-          <p:txBody>
-            <a:bodyPr wrap="square" lIns="0" tIns="0" rIns="0" bIns="0" rtlCol="0">
-              <a:noAutofit/>
-            </a:bodyPr>
-            <a:lstStyle/>
-            <a:p>
-              <a:pPr algn="l">
-                <a:lnSpc>
-                  <a:spcPct val="90000"/>
-                </a:lnSpc>
-              </a:pPr>
-              <a:r>
-                <a:rPr lang="en-US" dirty="0" err="1"/>
-                <a:t>s.t.</a:t>
-              </a:r>
-              <a:r>
-                <a:rPr lang="en-US" dirty="0"/>
-                <a:t>,</a:t>
-              </a:r>
-              <a:endParaRPr lang="en-GB" dirty="0"/>
-            </a:p>
-          </p:txBody>
-        </p:sp>
-        <p:sp>
-          <p:nvSpPr>
-            <p:cNvPr id="32" name="TextBox 31">
-              <a:extLst>
-                <a:ext uri="{FF2B5EF4-FFF2-40B4-BE49-F238E27FC236}">
-                  <a16:creationId xmlns:a16="http://schemas.microsoft.com/office/drawing/2014/main" id="{3596F0E7-04A0-06B2-E1C8-32532047092A}"/>
-                </a:ext>
-              </a:extLst>
-            </p:cNvPr>
-            <p:cNvSpPr txBox="1"/>
-            <p:nvPr/>
-          </p:nvSpPr>
-          <p:spPr>
-            <a:xfrm>
-              <a:off x="683063" y="19901782"/>
-              <a:ext cx="517087" cy="307776"/>
-            </a:xfrm>
-            <a:prstGeom prst="rect">
-              <a:avLst/>
-            </a:prstGeom>
-            <a:noFill/>
-          </p:spPr>
-          <p:txBody>
-            <a:bodyPr wrap="square" lIns="0" tIns="0" rIns="0" bIns="0" rtlCol="0">
-              <a:noAutofit/>
-            </a:bodyPr>
-            <a:lstStyle/>
-            <a:p>
-              <a:pPr algn="l">
-                <a:lnSpc>
-                  <a:spcPct val="90000"/>
-                </a:lnSpc>
-              </a:pPr>
-              <a:r>
-                <a:rPr lang="en-US" dirty="0"/>
-                <a:t>OCP</a:t>
-              </a:r>
-              <a:endParaRPr lang="en-GB" dirty="0"/>
-            </a:p>
-          </p:txBody>
-        </p:sp>
       </p:grpSp>
-      <p:sp>
-        <p:nvSpPr>
-          <p:cNvPr id="69" name="TextBox 68">
-            <a:extLst>
-              <a:ext uri="{FF2B5EF4-FFF2-40B4-BE49-F238E27FC236}">
-                <a16:creationId xmlns:a16="http://schemas.microsoft.com/office/drawing/2014/main" id="{D55544B8-DC83-94AE-6521-1FC273D4EECE}"/>
-              </a:ext>
-            </a:extLst>
-          </p:cNvPr>
-          <p:cNvSpPr txBox="1"/>
-          <p:nvPr/>
-        </p:nvSpPr>
-        <p:spPr>
-          <a:xfrm>
-            <a:off x="7878594" y="22502538"/>
-            <a:ext cx="374143" cy="750187"/>
-          </a:xfrm>
-          <a:prstGeom prst="rect">
-            <a:avLst/>
-          </a:prstGeom>
-          <a:noFill/>
-        </p:spPr>
-        <p:txBody>
-          <a:bodyPr wrap="square" lIns="0" tIns="0" rIns="0" bIns="0" rtlCol="0">
-            <a:noAutofit/>
-          </a:bodyPr>
-          <a:lstStyle/>
-          <a:p>
-            <a:pPr algn="l">
-              <a:lnSpc>
-                <a:spcPct val="90000"/>
-              </a:lnSpc>
-            </a:pPr>
-            <a:r>
-              <a:rPr lang="en-US" sz="1700" dirty="0"/>
-              <a:t>(1)</a:t>
-            </a:r>
-            <a:endParaRPr lang="en-GB" sz="1700" dirty="0"/>
-          </a:p>
-        </p:txBody>
-      </p:sp>
-      <mc:AlternateContent xmlns:mc="http://schemas.openxmlformats.org/markup-compatibility/2006">
-        <mc:Choice xmlns:a14="http://schemas.microsoft.com/office/drawing/2010/main" Requires="a14">
-          <p:sp>
-            <p:nvSpPr>
-              <p:cNvPr id="70" name="TextBox 69">
-                <a:extLst>
-                  <a:ext uri="{FF2B5EF4-FFF2-40B4-BE49-F238E27FC236}">
-                    <a16:creationId xmlns:a16="http://schemas.microsoft.com/office/drawing/2014/main" id="{EE41779E-8DFD-09D6-72AE-F688CBA67656}"/>
-                  </a:ext>
-                </a:extLst>
-              </p:cNvPr>
-              <p:cNvSpPr txBox="1"/>
-              <p:nvPr/>
-            </p:nvSpPr>
-            <p:spPr>
-              <a:xfrm>
-                <a:off x="572269" y="23880363"/>
-                <a:ext cx="4346250" cy="914400"/>
-              </a:xfrm>
-              <a:prstGeom prst="rect">
-                <a:avLst/>
-              </a:prstGeom>
-              <a:noFill/>
-            </p:spPr>
-            <p:txBody>
-              <a:bodyPr wrap="none" lIns="0" tIns="0" rIns="0" bIns="0" rtlCol="0">
-                <a:noAutofit/>
-              </a:bodyPr>
-              <a:lstStyle/>
-              <a:p>
-                <a:pPr>
-                  <a:lnSpc>
-                    <a:spcPct val="90000"/>
-                  </a:lnSpc>
-                </a:pPr>
-                <a14:m>
-                  <m:oMath xmlns:m="http://schemas.openxmlformats.org/officeDocument/2006/math">
-                    <m:sSub>
-                      <m:sSubPr>
-                        <m:ctrlPr>
-                          <a:rPr lang="en-US" sz="1700" i="1">
-                            <a:latin typeface="Cambria Math" panose="02040503050406030204" pitchFamily="18" charset="0"/>
-                          </a:rPr>
-                        </m:ctrlPr>
-                      </m:sSubPr>
-                      <m:e>
-                        <m:r>
-                          <a:rPr lang="en-US" sz="1700" i="1">
-                            <a:latin typeface="Cambria Math" panose="02040503050406030204" pitchFamily="18" charset="0"/>
-                          </a:rPr>
-                          <m:t>𝜋</m:t>
-                        </m:r>
-                      </m:e>
-                      <m:sub>
-                        <m:r>
-                          <a:rPr lang="en-US" sz="1700" i="1">
-                            <a:latin typeface="Cambria Math" panose="02040503050406030204" pitchFamily="18" charset="0"/>
-                          </a:rPr>
-                          <m:t>𝜏</m:t>
-                        </m:r>
-                      </m:sub>
-                    </m:sSub>
-                  </m:oMath>
-                </a14:m>
-                <a:r>
-                  <a:rPr lang="en-GB" sz="1700" dirty="0"/>
-                  <a:t>: Portfolio distribution at time </a:t>
-                </a:r>
-                <a14:m>
-                  <m:oMath xmlns:m="http://schemas.openxmlformats.org/officeDocument/2006/math">
-                    <m:r>
-                      <a:rPr lang="en-US" sz="1700" i="1">
-                        <a:latin typeface="Cambria Math" panose="02040503050406030204" pitchFamily="18" charset="0"/>
-                      </a:rPr>
-                      <m:t>𝜏</m:t>
-                    </m:r>
-                  </m:oMath>
-                </a14:m>
-                <a:endParaRPr lang="en-US" sz="1700" dirty="0"/>
-              </a:p>
-              <a:p>
-                <a:pPr>
-                  <a:lnSpc>
-                    <a:spcPct val="90000"/>
-                  </a:lnSpc>
-                </a:pPr>
-                <a14:m>
-                  <m:oMath xmlns:m="http://schemas.openxmlformats.org/officeDocument/2006/math">
-                    <m:sSub>
-                      <m:sSubPr>
-                        <m:ctrlPr>
-                          <a:rPr lang="en-US" sz="1700" i="1">
-                            <a:latin typeface="Cambria Math" panose="02040503050406030204" pitchFamily="18" charset="0"/>
-                          </a:rPr>
-                        </m:ctrlPr>
-                      </m:sSubPr>
-                      <m:e>
-                        <m:acc>
-                          <m:accPr>
-                            <m:chr m:val="̂"/>
-                            <m:ctrlPr>
-                              <a:rPr lang="en-US" sz="1700" i="1">
-                                <a:latin typeface="Cambria Math" panose="02040503050406030204" pitchFamily="18" charset="0"/>
-                              </a:rPr>
-                            </m:ctrlPr>
-                          </m:accPr>
-                          <m:e>
-                            <m:r>
-                              <a:rPr lang="en-US" sz="1700" i="1">
-                                <a:latin typeface="Cambria Math" panose="02040503050406030204" pitchFamily="18" charset="0"/>
-                              </a:rPr>
-                              <m:t>𝑟</m:t>
-                            </m:r>
-                          </m:e>
-                        </m:acc>
-                      </m:e>
-                      <m:sub>
-                        <m:r>
-                          <a:rPr lang="en-US" sz="1700" i="1">
-                            <a:latin typeface="Cambria Math" panose="02040503050406030204" pitchFamily="18" charset="0"/>
-                          </a:rPr>
-                          <m:t>𝜏</m:t>
-                        </m:r>
-                        <m:r>
-                          <a:rPr lang="en-US" sz="1700" i="1">
-                            <a:latin typeface="Cambria Math" panose="02040503050406030204" pitchFamily="18" charset="0"/>
-                          </a:rPr>
-                          <m:t>|</m:t>
-                        </m:r>
-                        <m:r>
-                          <a:rPr lang="en-US" sz="1700" i="1">
-                            <a:latin typeface="Cambria Math" panose="02040503050406030204" pitchFamily="18" charset="0"/>
-                          </a:rPr>
-                          <m:t>𝑡</m:t>
-                        </m:r>
-                      </m:sub>
-                    </m:sSub>
-                  </m:oMath>
-                </a14:m>
-                <a:r>
-                  <a:rPr lang="en-GB" sz="1700" dirty="0"/>
-                  <a:t>: Expected return at time </a:t>
-                </a:r>
-                <a14:m>
-                  <m:oMath xmlns:m="http://schemas.openxmlformats.org/officeDocument/2006/math">
-                    <m:r>
-                      <a:rPr lang="en-US" sz="1700" i="1">
-                        <a:latin typeface="Cambria Math" panose="02040503050406030204" pitchFamily="18" charset="0"/>
-                      </a:rPr>
-                      <m:t>𝜏</m:t>
-                    </m:r>
-                  </m:oMath>
-                </a14:m>
-                <a:r>
-                  <a:rPr lang="en-GB" sz="1700" dirty="0"/>
-                  <a:t> as of time t</a:t>
-                </a:r>
-              </a:p>
-              <a:p>
-                <a:pPr>
-                  <a:lnSpc>
-                    <a:spcPct val="90000"/>
-                  </a:lnSpc>
-                </a:pPr>
-                <a14:m>
-                  <m:oMath xmlns:m="http://schemas.openxmlformats.org/officeDocument/2006/math">
-                    <m:sSub>
-                      <m:sSubPr>
-                        <m:ctrlPr>
-                          <a:rPr lang="en-US" sz="1700" i="1">
-                            <a:latin typeface="Cambria Math" panose="02040503050406030204" pitchFamily="18" charset="0"/>
-                          </a:rPr>
-                        </m:ctrlPr>
-                      </m:sSubPr>
-                      <m:e>
-                        <m:acc>
-                          <m:accPr>
-                            <m:chr m:val="̂"/>
-                            <m:ctrlPr>
-                              <a:rPr lang="en-US" sz="1700" i="1">
-                                <a:latin typeface="Cambria Math" panose="02040503050406030204" pitchFamily="18" charset="0"/>
-                              </a:rPr>
-                            </m:ctrlPr>
-                          </m:accPr>
-                          <m:e>
-                            <m:r>
-                              <m:rPr>
-                                <m:sty m:val="p"/>
-                              </m:rPr>
-                              <a:rPr lang="en-US" sz="1700">
-                                <a:latin typeface="Cambria Math" panose="02040503050406030204" pitchFamily="18" charset="0"/>
-                              </a:rPr>
-                              <m:t>Σ</m:t>
-                            </m:r>
-                          </m:e>
-                        </m:acc>
-                      </m:e>
-                      <m:sub>
-                        <m:r>
-                          <a:rPr lang="en-US" sz="1700" i="1">
-                            <a:latin typeface="Cambria Math" panose="02040503050406030204" pitchFamily="18" charset="0"/>
-                          </a:rPr>
-                          <m:t>𝜏</m:t>
-                        </m:r>
-                        <m:r>
-                          <a:rPr lang="en-US" sz="1700" i="1">
-                            <a:latin typeface="Cambria Math" panose="02040503050406030204" pitchFamily="18" charset="0"/>
-                          </a:rPr>
-                          <m:t>|</m:t>
-                        </m:r>
-                        <m:r>
-                          <a:rPr lang="en-US" sz="1700" i="1">
-                            <a:latin typeface="Cambria Math" panose="02040503050406030204" pitchFamily="18" charset="0"/>
-                          </a:rPr>
-                          <m:t>𝑡</m:t>
-                        </m:r>
-                      </m:sub>
-                    </m:sSub>
-                  </m:oMath>
-                </a14:m>
-                <a:r>
-                  <a:rPr lang="en-GB" sz="1700" dirty="0"/>
-                  <a:t>: Covariance matrix at time </a:t>
-                </a:r>
-                <a14:m>
-                  <m:oMath xmlns:m="http://schemas.openxmlformats.org/officeDocument/2006/math">
-                    <m:r>
-                      <a:rPr lang="en-US" sz="1700" i="1">
-                        <a:latin typeface="Cambria Math" panose="02040503050406030204" pitchFamily="18" charset="0"/>
-                      </a:rPr>
-                      <m:t>𝜏</m:t>
-                    </m:r>
-                    <m:r>
-                      <a:rPr lang="en-US" sz="1700" i="1">
-                        <a:latin typeface="Cambria Math" panose="02040503050406030204" pitchFamily="18" charset="0"/>
-                      </a:rPr>
-                      <m:t> </m:t>
-                    </m:r>
-                  </m:oMath>
-                </a14:m>
-                <a:r>
-                  <a:rPr lang="en-GB" sz="1700" dirty="0"/>
-                  <a:t>as of time t</a:t>
-                </a:r>
-              </a:p>
-              <a:p>
-                <a:pPr>
-                  <a:lnSpc>
-                    <a:spcPct val="90000"/>
-                  </a:lnSpc>
-                </a:pPr>
-                <a:endParaRPr lang="en-US" sz="1700" dirty="0"/>
-              </a:p>
-              <a:p>
-                <a:pPr>
-                  <a:lnSpc>
-                    <a:spcPct val="90000"/>
-                  </a:lnSpc>
-                </a:pPr>
-                <a:endParaRPr lang="en-US" sz="1700" dirty="0"/>
-              </a:p>
-              <a:p>
-                <a:pPr>
-                  <a:lnSpc>
-                    <a:spcPct val="90000"/>
-                  </a:lnSpc>
-                </a:pPr>
-                <a:endParaRPr lang="en-GB" sz="1700" dirty="0"/>
-              </a:p>
-              <a:p>
-                <a:pPr>
-                  <a:lnSpc>
-                    <a:spcPct val="90000"/>
-                  </a:lnSpc>
-                </a:pPr>
-                <a:endParaRPr lang="en-GB" sz="1700" dirty="0"/>
-              </a:p>
-              <a:p>
-                <a:pPr>
-                  <a:lnSpc>
-                    <a:spcPct val="90000"/>
-                  </a:lnSpc>
-                </a:pPr>
-                <a:endParaRPr lang="en-GB" sz="1700" dirty="0"/>
-              </a:p>
-            </p:txBody>
-          </p:sp>
-        </mc:Choice>
-        <mc:Fallback>
-          <p:sp>
-            <p:nvSpPr>
-              <p:cNvPr id="70" name="TextBox 69">
-                <a:extLst>
-                  <a:ext uri="{FF2B5EF4-FFF2-40B4-BE49-F238E27FC236}">
-                    <a16:creationId xmlns:a16="http://schemas.microsoft.com/office/drawing/2014/main" id="{EE41779E-8DFD-09D6-72AE-F688CBA67656}"/>
-                  </a:ext>
-                </a:extLst>
-              </p:cNvPr>
-              <p:cNvSpPr txBox="1">
-                <a:spLocks noRot="1" noChangeAspect="1" noMove="1" noResize="1" noEditPoints="1" noAdjustHandles="1" noChangeArrowheads="1" noChangeShapeType="1" noTextEdit="1"/>
-              </p:cNvSpPr>
-              <p:nvPr/>
-            </p:nvSpPr>
-            <p:spPr>
-              <a:xfrm>
-                <a:off x="572269" y="23880363"/>
-                <a:ext cx="4346250" cy="914400"/>
-              </a:xfrm>
-              <a:prstGeom prst="rect">
-                <a:avLst/>
-              </a:prstGeom>
-              <a:blipFill>
-                <a:blip r:embed="rId13"/>
-                <a:stretch>
-                  <a:fillRect l="-1823" t="-10000"/>
-                </a:stretch>
-              </a:blipFill>
-            </p:spPr>
-            <p:txBody>
-              <a:bodyPr/>
-              <a:lstStyle/>
-              <a:p>
-                <a:r>
-                  <a:rPr lang="en-GB">
-                    <a:noFill/>
-                  </a:rPr>
-                  <a:t> </a:t>
-                </a:r>
-              </a:p>
-            </p:txBody>
-          </p:sp>
-        </mc:Fallback>
-      </mc:AlternateContent>
-      <mc:AlternateContent xmlns:mc="http://schemas.openxmlformats.org/markup-compatibility/2006">
-        <mc:Choice xmlns:a14="http://schemas.microsoft.com/office/drawing/2010/main" Requires="a14">
-          <p:sp>
-            <p:nvSpPr>
-              <p:cNvPr id="72" name="TextBox 71">
-                <a:extLst>
-                  <a:ext uri="{FF2B5EF4-FFF2-40B4-BE49-F238E27FC236}">
-                    <a16:creationId xmlns:a16="http://schemas.microsoft.com/office/drawing/2014/main" id="{DA689300-C4DE-4441-23FF-942156BBCCF5}"/>
-                  </a:ext>
-                </a:extLst>
-              </p:cNvPr>
-              <p:cNvSpPr txBox="1"/>
-              <p:nvPr/>
-            </p:nvSpPr>
-            <p:spPr>
-              <a:xfrm>
-                <a:off x="4910932" y="23880363"/>
-                <a:ext cx="2813182" cy="810478"/>
-              </a:xfrm>
-              <a:prstGeom prst="rect">
-                <a:avLst/>
-              </a:prstGeom>
-              <a:noFill/>
-            </p:spPr>
-            <p:txBody>
-              <a:bodyPr wrap="square">
-                <a:spAutoFit/>
-              </a:bodyPr>
-              <a:lstStyle/>
-              <a:p>
-                <a:pPr>
-                  <a:lnSpc>
-                    <a:spcPct val="90000"/>
-                  </a:lnSpc>
-                </a:pPr>
-                <a14:m>
-                  <m:oMath xmlns:m="http://schemas.openxmlformats.org/officeDocument/2006/math">
-                    <m:r>
-                      <a:rPr lang="en-US" sz="1700" i="1">
-                        <a:latin typeface="Cambria Math" panose="02040503050406030204" pitchFamily="18" charset="0"/>
-                      </a:rPr>
-                      <m:t>𝐻</m:t>
-                    </m:r>
-                  </m:oMath>
-                </a14:m>
-                <a:r>
-                  <a:rPr lang="en-GB" sz="1700" dirty="0"/>
-                  <a:t>: </a:t>
-                </a:r>
-                <a:r>
-                  <a:rPr lang="en-US" sz="1700" dirty="0"/>
-                  <a:t>Horizon</a:t>
-                </a:r>
-              </a:p>
-              <a:p>
-                <a:pPr>
-                  <a:lnSpc>
-                    <a:spcPct val="90000"/>
-                  </a:lnSpc>
-                </a:pPr>
-                <a14:m>
-                  <m:oMath xmlns:m="http://schemas.openxmlformats.org/officeDocument/2006/math">
-                    <m:sSup>
-                      <m:sSupPr>
-                        <m:ctrlPr>
-                          <a:rPr lang="en-US" sz="1700" i="1">
-                            <a:latin typeface="Cambria Math" panose="02040503050406030204" pitchFamily="18" charset="0"/>
-                          </a:rPr>
-                        </m:ctrlPr>
-                      </m:sSupPr>
-                      <m:e>
-                        <m:r>
-                          <a:rPr lang="en-US" sz="1700" i="1">
-                            <a:latin typeface="Cambria Math" panose="02040503050406030204" pitchFamily="18" charset="0"/>
-                          </a:rPr>
-                          <m:t>𝛾</m:t>
-                        </m:r>
-                      </m:e>
-                      <m:sup>
-                        <m:r>
-                          <a:rPr lang="en-US" sz="1700" i="1">
-                            <a:latin typeface="Cambria Math" panose="02040503050406030204" pitchFamily="18" charset="0"/>
-                          </a:rPr>
-                          <m:t>𝑟𝑖𝑠𝑘</m:t>
-                        </m:r>
-                      </m:sup>
-                    </m:sSup>
-                  </m:oMath>
-                </a14:m>
-                <a:r>
-                  <a:rPr lang="en-GB" sz="1700" dirty="0"/>
-                  <a:t>: </a:t>
-                </a:r>
-                <a:r>
-                  <a:rPr lang="en-US" sz="1700" dirty="0"/>
-                  <a:t>Risk weight factor</a:t>
-                </a:r>
-              </a:p>
-              <a:p>
-                <a:pPr>
-                  <a:lnSpc>
-                    <a:spcPct val="90000"/>
-                  </a:lnSpc>
-                </a:pPr>
-                <a14:m>
-                  <m:oMath xmlns:m="http://schemas.openxmlformats.org/officeDocument/2006/math">
-                    <m:sSup>
-                      <m:sSupPr>
-                        <m:ctrlPr>
-                          <a:rPr lang="en-US" sz="1700" i="1">
-                            <a:latin typeface="Cambria Math" panose="02040503050406030204" pitchFamily="18" charset="0"/>
-                          </a:rPr>
-                        </m:ctrlPr>
-                      </m:sSupPr>
-                      <m:e>
-                        <m:r>
-                          <a:rPr lang="en-US" sz="1700" i="1">
-                            <a:latin typeface="Cambria Math" panose="02040503050406030204" pitchFamily="18" charset="0"/>
-                          </a:rPr>
-                          <m:t>𝛾</m:t>
-                        </m:r>
-                      </m:e>
-                      <m:sup>
-                        <m:r>
-                          <a:rPr lang="en-US" sz="1700" i="1">
-                            <a:latin typeface="Cambria Math" panose="02040503050406030204" pitchFamily="18" charset="0"/>
-                          </a:rPr>
-                          <m:t>𝑡𝑟𝑎𝑑𝑒</m:t>
-                        </m:r>
-                      </m:sup>
-                    </m:sSup>
-                  </m:oMath>
-                </a14:m>
-                <a:r>
-                  <a:rPr lang="en-GB" sz="1700" dirty="0"/>
-                  <a:t>: </a:t>
-                </a:r>
-                <a:r>
-                  <a:rPr lang="en-US" sz="1700" dirty="0"/>
-                  <a:t>Sell/buy cost</a:t>
-                </a:r>
-              </a:p>
-            </p:txBody>
-          </p:sp>
-        </mc:Choice>
-        <mc:Fallback>
-          <p:sp>
-            <p:nvSpPr>
-              <p:cNvPr id="72" name="TextBox 71">
-                <a:extLst>
-                  <a:ext uri="{FF2B5EF4-FFF2-40B4-BE49-F238E27FC236}">
-                    <a16:creationId xmlns:a16="http://schemas.microsoft.com/office/drawing/2014/main" id="{DA689300-C4DE-4441-23FF-942156BBCCF5}"/>
-                  </a:ext>
-                </a:extLst>
-              </p:cNvPr>
-              <p:cNvSpPr txBox="1">
-                <a:spLocks noRot="1" noChangeAspect="1" noMove="1" noResize="1" noEditPoints="1" noAdjustHandles="1" noChangeArrowheads="1" noChangeShapeType="1" noTextEdit="1"/>
-              </p:cNvSpPr>
-              <p:nvPr/>
-            </p:nvSpPr>
-            <p:spPr>
-              <a:xfrm>
-                <a:off x="4910932" y="23880363"/>
-                <a:ext cx="2813182" cy="810478"/>
-              </a:xfrm>
-              <a:prstGeom prst="rect">
-                <a:avLst/>
-              </a:prstGeom>
-              <a:blipFill>
-                <a:blip r:embed="rId14"/>
-                <a:stretch>
-                  <a:fillRect t="-5263" b="-9774"/>
-                </a:stretch>
-              </a:blipFill>
-            </p:spPr>
-            <p:txBody>
-              <a:bodyPr/>
-              <a:lstStyle/>
-              <a:p>
-                <a:r>
-                  <a:rPr lang="en-GB">
-                    <a:noFill/>
-                  </a:rPr>
-                  <a:t> </a:t>
-                </a:r>
-              </a:p>
-            </p:txBody>
-          </p:sp>
-        </mc:Fallback>
-      </mc:AlternateContent>
-      <p:pic>
-        <p:nvPicPr>
-          <p:cNvPr id="76" name="Picture 75" descr="A qr code with a graph and candlestick chart&#10;&#10;Description automatically generated">
-            <a:extLst>
-              <a:ext uri="{FF2B5EF4-FFF2-40B4-BE49-F238E27FC236}">
-                <a16:creationId xmlns:a16="http://schemas.microsoft.com/office/drawing/2014/main" id="{03CA65C1-F594-993D-D80A-545219561D06}"/>
-              </a:ext>
-            </a:extLst>
-          </p:cNvPr>
-          <p:cNvPicPr>
-            <a:picLocks noChangeAspect="1"/>
-          </p:cNvPicPr>
-          <p:nvPr/>
-        </p:nvPicPr>
-        <p:blipFill>
-          <a:blip r:embed="rId15">
-            <a:extLst>
-              <a:ext uri="{28A0092B-C50C-407E-A947-70E740481C1C}">
-                <a14:useLocalDpi xmlns:a14="http://schemas.microsoft.com/office/drawing/2010/main" val="0"/>
-              </a:ext>
-            </a:extLst>
-          </a:blip>
-          <a:stretch>
-            <a:fillRect/>
-          </a:stretch>
-        </p:blipFill>
-        <p:spPr>
-          <a:xfrm>
-            <a:off x="6500427" y="6264480"/>
-            <a:ext cx="1300904" cy="1300904"/>
-          </a:xfrm>
-          <a:prstGeom prst="rect">
-            <a:avLst/>
-          </a:prstGeom>
-        </p:spPr>
-      </p:pic>
     </p:spTree>
     <p:extLst>
       <p:ext uri="{BB962C8B-B14F-4D97-AF65-F5344CB8AC3E}">

</xml_diff>